<commit_message>
Présentation Projet 6 Data Scientist.pptx
</commit_message>
<xml_diff>
--- a/Présentation Projet 6 Data Scientist.pptx
+++ b/Présentation Projet 6 Data Scientist.pptx
@@ -10,13 +10,13 @@
   <p:sldIdLst>
     <p:sldId id="256" r:id="rId2"/>
     <p:sldId id="257" r:id="rId3"/>
-    <p:sldId id="258" r:id="rId4"/>
-    <p:sldId id="259" r:id="rId5"/>
-    <p:sldId id="261" r:id="rId6"/>
+    <p:sldId id="261" r:id="rId4"/>
+    <p:sldId id="281" r:id="rId5"/>
+    <p:sldId id="280" r:id="rId6"/>
     <p:sldId id="274" r:id="rId7"/>
     <p:sldId id="263" r:id="rId8"/>
-    <p:sldId id="278" r:id="rId9"/>
-    <p:sldId id="264" r:id="rId10"/>
+    <p:sldId id="264" r:id="rId9"/>
+    <p:sldId id="278" r:id="rId10"/>
     <p:sldId id="272" r:id="rId11"/>
     <p:sldId id="265" r:id="rId12"/>
     <p:sldId id="276" r:id="rId13"/>
@@ -27,7 +27,7 @@
     <p:sldId id="279" r:id="rId18"/>
   </p:sldIdLst>
   <p:sldSz cx="12192000" cy="6858000"/>
-  <p:notesSz cx="6858000" cy="9144000"/>
+  <p:notesSz cx="7104063" cy="10234613"/>
   <p:defaultTextStyle>
     <a:defPPr>
       <a:defRPr lang="de-DE"/>
@@ -178,17 +178,17 @@
         <p:spPr>
           <a:xfrm>
             <a:off x="0" y="0"/>
-            <a:ext cx="2971800" cy="458788"/>
+            <a:ext cx="3078427" cy="513508"/>
           </a:xfrm>
           <a:prstGeom prst="rect">
             <a:avLst/>
           </a:prstGeom>
         </p:spPr>
         <p:txBody>
-          <a:bodyPr vert="horz" lIns="91440" tIns="45720" rIns="91440" bIns="45720" rtlCol="0"/>
+          <a:bodyPr vert="horz" lIns="99075" tIns="49538" rIns="99075" bIns="49538" rtlCol="0"/>
           <a:lstStyle>
             <a:lvl1pPr algn="l">
-              <a:defRPr sz="1200"/>
+              <a:defRPr sz="1300"/>
             </a:lvl1pPr>
           </a:lstStyle>
           <a:p>
@@ -208,24 +208,24 @@
         </p:nvSpPr>
         <p:spPr>
           <a:xfrm>
-            <a:off x="3884613" y="0"/>
-            <a:ext cx="2971800" cy="458788"/>
+            <a:off x="4023992" y="0"/>
+            <a:ext cx="3078427" cy="513508"/>
           </a:xfrm>
           <a:prstGeom prst="rect">
             <a:avLst/>
           </a:prstGeom>
         </p:spPr>
         <p:txBody>
-          <a:bodyPr vert="horz" lIns="91440" tIns="45720" rIns="91440" bIns="45720" rtlCol="0"/>
+          <a:bodyPr vert="horz" lIns="99075" tIns="49538" rIns="99075" bIns="49538" rtlCol="0"/>
           <a:lstStyle>
             <a:lvl1pPr algn="r">
-              <a:defRPr sz="1200"/>
+              <a:defRPr sz="1300"/>
             </a:lvl1pPr>
           </a:lstStyle>
           <a:p>
             <a:fld id="{C96B4C23-CEAE-47B0-B317-ED7852EA513E}" type="datetimeFigureOut">
               <a:rPr lang="fr-FR" smtClean="0"/>
-              <a:t>16/07/2020</a:t>
+              <a:t>19/07/2020</a:t>
             </a:fld>
             <a:endParaRPr lang="fr-FR"/>
           </a:p>
@@ -243,8 +243,8 @@
         </p:nvSpPr>
         <p:spPr>
           <a:xfrm>
-            <a:off x="685800" y="1143000"/>
-            <a:ext cx="5486400" cy="3086100"/>
+            <a:off x="482600" y="1279525"/>
+            <a:ext cx="6140450" cy="3454400"/>
           </a:xfrm>
           <a:prstGeom prst="rect">
             <a:avLst/>
@@ -257,7 +257,7 @@
           </a:ln>
         </p:spPr>
         <p:txBody>
-          <a:bodyPr vert="horz" lIns="91440" tIns="45720" rIns="91440" bIns="45720" rtlCol="0" anchor="ctr"/>
+          <a:bodyPr vert="horz" lIns="99075" tIns="49538" rIns="99075" bIns="49538" rtlCol="0" anchor="ctr"/>
           <a:lstStyle/>
           <a:p>
             <a:endParaRPr lang="fr-FR"/>
@@ -276,15 +276,15 @@
         </p:nvSpPr>
         <p:spPr>
           <a:xfrm>
-            <a:off x="685800" y="4400550"/>
-            <a:ext cx="5486400" cy="3600450"/>
+            <a:off x="710407" y="4925407"/>
+            <a:ext cx="5683250" cy="4029879"/>
           </a:xfrm>
           <a:prstGeom prst="rect">
             <a:avLst/>
           </a:prstGeom>
         </p:spPr>
         <p:txBody>
-          <a:bodyPr vert="horz" lIns="91440" tIns="45720" rIns="91440" bIns="45720" rtlCol="0"/>
+          <a:bodyPr vert="horz" lIns="99075" tIns="49538" rIns="99075" bIns="49538" rtlCol="0"/>
           <a:lstStyle/>
           <a:p>
             <a:pPr lvl="0"/>
@@ -335,18 +335,18 @@
         </p:nvSpPr>
         <p:spPr>
           <a:xfrm>
-            <a:off x="0" y="8685213"/>
-            <a:ext cx="2971800" cy="458787"/>
+            <a:off x="0" y="9721107"/>
+            <a:ext cx="3078427" cy="513507"/>
           </a:xfrm>
           <a:prstGeom prst="rect">
             <a:avLst/>
           </a:prstGeom>
         </p:spPr>
         <p:txBody>
-          <a:bodyPr vert="horz" lIns="91440" tIns="45720" rIns="91440" bIns="45720" rtlCol="0" anchor="b"/>
+          <a:bodyPr vert="horz" lIns="99075" tIns="49538" rIns="99075" bIns="49538" rtlCol="0" anchor="b"/>
           <a:lstStyle>
             <a:lvl1pPr algn="l">
-              <a:defRPr sz="1200"/>
+              <a:defRPr sz="1300"/>
             </a:lvl1pPr>
           </a:lstStyle>
           <a:p>
@@ -366,18 +366,18 @@
         </p:nvSpPr>
         <p:spPr>
           <a:xfrm>
-            <a:off x="3884613" y="8685213"/>
-            <a:ext cx="2971800" cy="458787"/>
+            <a:off x="4023992" y="9721107"/>
+            <a:ext cx="3078427" cy="513507"/>
           </a:xfrm>
           <a:prstGeom prst="rect">
             <a:avLst/>
           </a:prstGeom>
         </p:spPr>
         <p:txBody>
-          <a:bodyPr vert="horz" lIns="91440" tIns="45720" rIns="91440" bIns="45720" rtlCol="0" anchor="b"/>
+          <a:bodyPr vert="horz" lIns="99075" tIns="49538" rIns="99075" bIns="49538" rtlCol="0" anchor="b"/>
           <a:lstStyle>
             <a:lvl1pPr algn="r">
-              <a:defRPr sz="1200"/>
+              <a:defRPr sz="1300"/>
             </a:lvl1pPr>
           </a:lstStyle>
           <a:p>
@@ -622,6 +622,217 @@
           <a:p>
             <a:r>
               <a:rPr lang="fr-FR" dirty="0"/>
+              <a:t>Dans un ensemble de document</a:t>
+            </a:r>
+            <a:r>
+              <a:rPr lang="fr-FR" b="1" u="sng" dirty="0"/>
+              <a:t>s</a:t>
+            </a:r>
+            <a:r>
+              <a:rPr lang="fr-FR" dirty="0"/>
+              <a:t>, </a:t>
+            </a:r>
+            <a:r>
+              <a:rPr lang="fr-FR" b="1" u="sng" dirty="0"/>
+              <a:t>1</a:t>
+            </a:r>
+            <a:r>
+              <a:rPr lang="fr-FR" dirty="0"/>
+              <a:t> Document = ensemble de Beta Topics</a:t>
+            </a:r>
+          </a:p>
+          <a:p>
+            <a:r>
+              <a:rPr lang="fr-FR" dirty="0"/>
+              <a:t>La distribution </a:t>
+            </a:r>
+            <a:r>
+              <a:rPr lang="fr-FR" dirty="0" err="1"/>
+              <a:t>Direichket</a:t>
+            </a:r>
+            <a:r>
+              <a:rPr lang="fr-FR" dirty="0"/>
+              <a:t> permet de représenter chaque documents en fonction de ces topics via une proba</a:t>
+            </a:r>
+          </a:p>
+        </p:txBody>
+      </p:sp>
+      <p:sp>
+        <p:nvSpPr>
+          <p:cNvPr id="4" name="Espace réservé du numéro de diapositive 3"/>
+          <p:cNvSpPr>
+            <a:spLocks noGrp="1"/>
+          </p:cNvSpPr>
+          <p:nvPr>
+            <p:ph type="sldNum" sz="quarter" idx="5"/>
+          </p:nvPr>
+        </p:nvSpPr>
+        <p:spPr/>
+        <p:txBody>
+          <a:bodyPr/>
+          <a:lstStyle/>
+          <a:p>
+            <a:fld id="{D6DE7155-B76A-40FC-9D02-406774D50C88}" type="slidenum">
+              <a:rPr lang="fr-FR" smtClean="0"/>
+              <a:t>13</a:t>
+            </a:fld>
+            <a:endParaRPr lang="fr-FR"/>
+          </a:p>
+        </p:txBody>
+      </p:sp>
+    </p:spTree>
+    <p:extLst>
+      <p:ext uri="{BB962C8B-B14F-4D97-AF65-F5344CB8AC3E}">
+        <p14:creationId xmlns:p14="http://schemas.microsoft.com/office/powerpoint/2010/main" val="3293342090"/>
+      </p:ext>
+    </p:extLst>
+  </p:cSld>
+  <p:clrMapOvr>
+    <a:masterClrMapping/>
+  </p:clrMapOvr>
+</p:notes>
+</file>
+
+<file path=ppt/notesSlides/notesSlide11.xml><?xml version="1.0" encoding="utf-8"?>
+<p:notes xmlns:a="http://schemas.openxmlformats.org/drawingml/2006/main" xmlns:r="http://schemas.openxmlformats.org/officeDocument/2006/relationships" xmlns:p="http://schemas.openxmlformats.org/presentationml/2006/main">
+  <p:cSld>
+    <p:spTree>
+      <p:nvGrpSpPr>
+        <p:cNvPr id="1" name=""/>
+        <p:cNvGrpSpPr/>
+        <p:nvPr/>
+      </p:nvGrpSpPr>
+      <p:grpSpPr>
+        <a:xfrm>
+          <a:off x="0" y="0"/>
+          <a:ext cx="0" cy="0"/>
+          <a:chOff x="0" y="0"/>
+          <a:chExt cx="0" cy="0"/>
+        </a:xfrm>
+      </p:grpSpPr>
+      <p:sp>
+        <p:nvSpPr>
+          <p:cNvPr id="2" name="Espace réservé de l'image des diapositives 1"/>
+          <p:cNvSpPr>
+            <a:spLocks noGrp="1" noRot="1" noChangeAspect="1"/>
+          </p:cNvSpPr>
+          <p:nvPr>
+            <p:ph type="sldImg"/>
+          </p:nvPr>
+        </p:nvSpPr>
+        <p:spPr/>
+      </p:sp>
+      <p:sp>
+        <p:nvSpPr>
+          <p:cNvPr id="3" name="Espace réservé des notes 2"/>
+          <p:cNvSpPr>
+            <a:spLocks noGrp="1"/>
+          </p:cNvSpPr>
+          <p:nvPr>
+            <p:ph type="body" idx="1"/>
+          </p:nvPr>
+        </p:nvSpPr>
+        <p:spPr/>
+        <p:txBody>
+          <a:bodyPr/>
+          <a:lstStyle/>
+          <a:p>
+            <a:r>
+              <a:rPr lang="fr-FR" sz="1300" dirty="0"/>
+              <a:t>Source: </a:t>
+            </a:r>
+            <a:r>
+              <a:rPr lang="fr-FR" sz="1300" dirty="0">
+                <a:hlinkClick r:id="rId3"/>
+              </a:rPr>
+              <a:t>https://www.researchgate.net/figure/Conceptual-illustration-of-non-negative-matrix-factorization-NMF-decomposition-of-a_fig1_312157184</a:t>
+            </a:r>
+            <a:endParaRPr lang="fr-FR" dirty="0"/>
+          </a:p>
+        </p:txBody>
+      </p:sp>
+      <p:sp>
+        <p:nvSpPr>
+          <p:cNvPr id="4" name="Espace réservé du numéro de diapositive 3"/>
+          <p:cNvSpPr>
+            <a:spLocks noGrp="1"/>
+          </p:cNvSpPr>
+          <p:nvPr>
+            <p:ph type="sldNum" sz="quarter" idx="5"/>
+          </p:nvPr>
+        </p:nvSpPr>
+        <p:spPr/>
+        <p:txBody>
+          <a:bodyPr/>
+          <a:lstStyle/>
+          <a:p>
+            <a:fld id="{D6DE7155-B76A-40FC-9D02-406774D50C88}" type="slidenum">
+              <a:rPr lang="fr-FR" smtClean="0"/>
+              <a:t>14</a:t>
+            </a:fld>
+            <a:endParaRPr lang="fr-FR"/>
+          </a:p>
+        </p:txBody>
+      </p:sp>
+    </p:spTree>
+    <p:extLst>
+      <p:ext uri="{BB962C8B-B14F-4D97-AF65-F5344CB8AC3E}">
+        <p14:creationId xmlns:p14="http://schemas.microsoft.com/office/powerpoint/2010/main" val="3113831051"/>
+      </p:ext>
+    </p:extLst>
+  </p:cSld>
+  <p:clrMapOvr>
+    <a:masterClrMapping/>
+  </p:clrMapOvr>
+</p:notes>
+</file>
+
+<file path=ppt/notesSlides/notesSlide12.xml><?xml version="1.0" encoding="utf-8"?>
+<p:notes xmlns:a="http://schemas.openxmlformats.org/drawingml/2006/main" xmlns:r="http://schemas.openxmlformats.org/officeDocument/2006/relationships" xmlns:p="http://schemas.openxmlformats.org/presentationml/2006/main">
+  <p:cSld>
+    <p:spTree>
+      <p:nvGrpSpPr>
+        <p:cNvPr id="1" name=""/>
+        <p:cNvGrpSpPr/>
+        <p:nvPr/>
+      </p:nvGrpSpPr>
+      <p:grpSpPr>
+        <a:xfrm>
+          <a:off x="0" y="0"/>
+          <a:ext cx="0" cy="0"/>
+          <a:chOff x="0" y="0"/>
+          <a:chExt cx="0" cy="0"/>
+        </a:xfrm>
+      </p:grpSpPr>
+      <p:sp>
+        <p:nvSpPr>
+          <p:cNvPr id="2" name="Espace réservé de l'image des diapositives 1"/>
+          <p:cNvSpPr>
+            <a:spLocks noGrp="1" noRot="1" noChangeAspect="1"/>
+          </p:cNvSpPr>
+          <p:nvPr>
+            <p:ph type="sldImg"/>
+          </p:nvPr>
+        </p:nvSpPr>
+        <p:spPr/>
+      </p:sp>
+      <p:sp>
+        <p:nvSpPr>
+          <p:cNvPr id="3" name="Espace réservé des notes 2"/>
+          <p:cNvSpPr>
+            <a:spLocks noGrp="1"/>
+          </p:cNvSpPr>
+          <p:nvPr>
+            <p:ph type="body" idx="1"/>
+          </p:nvPr>
+        </p:nvSpPr>
+        <p:spPr/>
+        <p:txBody>
+          <a:bodyPr/>
+          <a:lstStyle/>
+          <a:p>
+            <a:r>
+              <a:rPr lang="fr-FR" dirty="0"/>
               <a:t>Résultat des train/test</a:t>
             </a:r>
           </a:p>
@@ -728,7 +939,7 @@
           <a:p>
             <a:fld id="{D6DE7155-B76A-40FC-9D02-406774D50C88}" type="slidenum">
               <a:rPr lang="fr-FR" smtClean="0"/>
-              <a:t>5</a:t>
+              <a:t>3</a:t>
             </a:fld>
             <a:endParaRPr lang="fr-FR"/>
           </a:p>
@@ -791,79 +1002,6 @@
           <a:bodyPr/>
           <a:lstStyle/>
           <a:p>
-            <a:r>
-              <a:rPr lang="fr-FR" dirty="0"/>
-              <a:t>Explique bien les données et pourquoi elles sont intéressante</a:t>
-            </a:r>
-          </a:p>
-          <a:p>
-            <a:r>
-              <a:rPr lang="fr-FR" dirty="0"/>
-              <a:t>Mettre en avant les  lien avec les après de la présentation</a:t>
-            </a:r>
-          </a:p>
-          <a:p>
-            <a:pPr marL="171450" indent="-171450">
-              <a:buFontTx/>
-              <a:buChar char="-"/>
-            </a:pPr>
-            <a:r>
-              <a:rPr lang="fr-FR" dirty="0"/>
-              <a:t>Superviser : tag …</a:t>
-            </a:r>
-          </a:p>
-          <a:p>
-            <a:pPr marL="171450" indent="-171450">
-              <a:buFontTx/>
-              <a:buChar char="-"/>
-            </a:pPr>
-            <a:r>
-              <a:rPr lang="fr-FR" dirty="0"/>
-              <a:t>Non superviser : pas tag …</a:t>
-            </a:r>
-          </a:p>
-          <a:p>
-            <a:pPr marL="171450" indent="-171450">
-              <a:buFontTx/>
-              <a:buChar char="-"/>
-            </a:pPr>
-            <a:endParaRPr lang="fr-FR" dirty="0"/>
-          </a:p>
-          <a:p>
-            <a:pPr marL="171450" indent="-171450">
-              <a:buFontTx/>
-              <a:buChar char="-"/>
-            </a:pPr>
-            <a:r>
-              <a:rPr lang="fr-FR" dirty="0"/>
-              <a:t>Score positif</a:t>
-            </a:r>
-          </a:p>
-          <a:p>
-            <a:pPr marL="171450" indent="-171450">
-              <a:buFontTx/>
-              <a:buChar char="-"/>
-            </a:pPr>
-            <a:r>
-              <a:rPr lang="fr-FR" dirty="0"/>
-              <a:t>Meilleur tag</a:t>
-            </a:r>
-          </a:p>
-          <a:p>
-            <a:pPr marL="171450" indent="-171450">
-              <a:buFontTx/>
-              <a:buChar char="-"/>
-            </a:pPr>
-            <a:r>
-              <a:rPr lang="fr-FR" dirty="0"/>
-              <a:t>Justifie</a:t>
-            </a:r>
-          </a:p>
-          <a:p>
-            <a:pPr marL="171450" indent="-171450">
-              <a:buFontTx/>
-              <a:buChar char="-"/>
-            </a:pPr>
             <a:endParaRPr lang="fr-FR" dirty="0"/>
           </a:p>
         </p:txBody>
@@ -885,16 +1023,16 @@
           <a:p>
             <a:fld id="{D6DE7155-B76A-40FC-9D02-406774D50C88}" type="slidenum">
               <a:rPr lang="fr-FR" smtClean="0"/>
-              <a:t>6</a:t>
+              <a:t>4</a:t>
             </a:fld>
-            <a:endParaRPr lang="fr-FR" dirty="0"/>
+            <a:endParaRPr lang="fr-FR"/>
           </a:p>
         </p:txBody>
       </p:sp>
     </p:spTree>
     <p:extLst>
       <p:ext uri="{BB962C8B-B14F-4D97-AF65-F5344CB8AC3E}">
-        <p14:creationId xmlns:p14="http://schemas.microsoft.com/office/powerpoint/2010/main" val="1481770463"/>
+        <p14:creationId xmlns:p14="http://schemas.microsoft.com/office/powerpoint/2010/main" val="3833690124"/>
       </p:ext>
     </p:extLst>
   </p:cSld>
@@ -948,25 +1086,6 @@
           <a:bodyPr/>
           <a:lstStyle/>
           <a:p>
-            <a:r>
-              <a:rPr lang="fr-FR" dirty="0"/>
-              <a:t>Avant pré </a:t>
-            </a:r>
-            <a:r>
-              <a:rPr lang="fr-FR" dirty="0" err="1"/>
-              <a:t>processing</a:t>
-            </a:r>
-            <a:endParaRPr lang="fr-FR" dirty="0"/>
-          </a:p>
-          <a:p>
-            <a:r>
-              <a:rPr lang="fr-FR" dirty="0"/>
-              <a:t>Après Pré </a:t>
-            </a:r>
-            <a:r>
-              <a:rPr lang="fr-FR" dirty="0" err="1"/>
-              <a:t>processing</a:t>
-            </a:r>
             <a:endParaRPr lang="fr-FR" dirty="0"/>
           </a:p>
         </p:txBody>
@@ -988,7 +1107,7 @@
           <a:p>
             <a:fld id="{D6DE7155-B76A-40FC-9D02-406774D50C88}" type="slidenum">
               <a:rPr lang="fr-FR" smtClean="0"/>
-              <a:t>8</a:t>
+              <a:t>5</a:t>
             </a:fld>
             <a:endParaRPr lang="fr-FR"/>
           </a:p>
@@ -997,7 +1116,7 @@
     </p:spTree>
     <p:extLst>
       <p:ext uri="{BB962C8B-B14F-4D97-AF65-F5344CB8AC3E}">
-        <p14:creationId xmlns:p14="http://schemas.microsoft.com/office/powerpoint/2010/main" val="2982545460"/>
+        <p14:creationId xmlns:p14="http://schemas.microsoft.com/office/powerpoint/2010/main" val="1306883512"/>
       </p:ext>
     </p:extLst>
   </p:cSld>
@@ -1053,8 +1172,78 @@
           <a:p>
             <a:r>
               <a:rPr lang="fr-FR" dirty="0"/>
-              <a:t>Définir TF-IDF</a:t>
-            </a:r>
+              <a:t>Explique bien les données et pourquoi elles sont intéressante</a:t>
+            </a:r>
+          </a:p>
+          <a:p>
+            <a:r>
+              <a:rPr lang="fr-FR" dirty="0"/>
+              <a:t>Mettre en avant les  lien avec les après de la présentation</a:t>
+            </a:r>
+          </a:p>
+          <a:p>
+            <a:pPr marL="185766" indent="-185766">
+              <a:buFontTx/>
+              <a:buChar char="-"/>
+            </a:pPr>
+            <a:r>
+              <a:rPr lang="fr-FR" dirty="0"/>
+              <a:t>Superviser : tag …</a:t>
+            </a:r>
+          </a:p>
+          <a:p>
+            <a:pPr marL="185766" indent="-185766">
+              <a:buFontTx/>
+              <a:buChar char="-"/>
+            </a:pPr>
+            <a:r>
+              <a:rPr lang="fr-FR" dirty="0"/>
+              <a:t>Non superviser : pas tag …</a:t>
+            </a:r>
+          </a:p>
+          <a:p>
+            <a:pPr marL="185766" indent="-185766">
+              <a:buFontTx/>
+              <a:buChar char="-"/>
+            </a:pPr>
+            <a:endParaRPr lang="fr-FR" dirty="0"/>
+          </a:p>
+          <a:p>
+            <a:pPr marL="185766" indent="-185766">
+              <a:buFontTx/>
+              <a:buChar char="-"/>
+            </a:pPr>
+            <a:r>
+              <a:rPr lang="fr-FR" dirty="0"/>
+              <a:t>Score positif</a:t>
+            </a:r>
+          </a:p>
+          <a:p>
+            <a:pPr marL="185766" indent="-185766">
+              <a:buFontTx/>
+              <a:buChar char="-"/>
+            </a:pPr>
+            <a:r>
+              <a:rPr lang="fr-FR" dirty="0"/>
+              <a:t>Meilleur tag</a:t>
+            </a:r>
+          </a:p>
+          <a:p>
+            <a:pPr marL="185766" indent="-185766">
+              <a:buFontTx/>
+              <a:buChar char="-"/>
+            </a:pPr>
+            <a:r>
+              <a:rPr lang="fr-FR" dirty="0"/>
+              <a:t>Justifie</a:t>
+            </a:r>
+          </a:p>
+          <a:p>
+            <a:pPr marL="185766" indent="-185766">
+              <a:buFontTx/>
+              <a:buChar char="-"/>
+            </a:pPr>
+            <a:endParaRPr lang="fr-FR" dirty="0"/>
           </a:p>
         </p:txBody>
       </p:sp>
@@ -1075,16 +1264,16 @@
           <a:p>
             <a:fld id="{D6DE7155-B76A-40FC-9D02-406774D50C88}" type="slidenum">
               <a:rPr lang="fr-FR" smtClean="0"/>
-              <a:t>9</a:t>
+              <a:t>6</a:t>
             </a:fld>
-            <a:endParaRPr lang="fr-FR"/>
+            <a:endParaRPr lang="fr-FR" dirty="0"/>
           </a:p>
         </p:txBody>
       </p:sp>
     </p:spTree>
     <p:extLst>
       <p:ext uri="{BB962C8B-B14F-4D97-AF65-F5344CB8AC3E}">
-        <p14:creationId xmlns:p14="http://schemas.microsoft.com/office/powerpoint/2010/main" val="2686634976"/>
+        <p14:creationId xmlns:p14="http://schemas.microsoft.com/office/powerpoint/2010/main" val="1481770463"/>
       </p:ext>
     </p:extLst>
   </p:cSld>
@@ -1138,7 +1327,10 @@
           <a:bodyPr/>
           <a:lstStyle/>
           <a:p>
-            <a:endParaRPr lang="fr-FR" dirty="0"/>
+            <a:r>
+              <a:rPr lang="fr-FR" dirty="0"/>
+              <a:t>Définir TF-IDF</a:t>
+            </a:r>
           </a:p>
         </p:txBody>
       </p:sp>
@@ -1159,7 +1351,7 @@
           <a:p>
             <a:fld id="{D6DE7155-B76A-40FC-9D02-406774D50C88}" type="slidenum">
               <a:rPr lang="fr-FR" smtClean="0"/>
-              <a:t>10</a:t>
+              <a:t>8</a:t>
             </a:fld>
             <a:endParaRPr lang="fr-FR"/>
           </a:p>
@@ -1168,7 +1360,7 @@
     </p:spTree>
     <p:extLst>
       <p:ext uri="{BB962C8B-B14F-4D97-AF65-F5344CB8AC3E}">
-        <p14:creationId xmlns:p14="http://schemas.microsoft.com/office/powerpoint/2010/main" val="165913331"/>
+        <p14:creationId xmlns:p14="http://schemas.microsoft.com/office/powerpoint/2010/main" val="2686634976"/>
       </p:ext>
     </p:extLst>
   </p:cSld>
@@ -1222,6 +1414,25 @@
           <a:bodyPr/>
           <a:lstStyle/>
           <a:p>
+            <a:r>
+              <a:rPr lang="fr-FR" dirty="0"/>
+              <a:t>Avant pré </a:t>
+            </a:r>
+            <a:r>
+              <a:rPr lang="fr-FR" dirty="0" err="1"/>
+              <a:t>processing</a:t>
+            </a:r>
+            <a:endParaRPr lang="fr-FR" dirty="0"/>
+          </a:p>
+          <a:p>
+            <a:r>
+              <a:rPr lang="fr-FR" dirty="0"/>
+              <a:t>Après Pré </a:t>
+            </a:r>
+            <a:r>
+              <a:rPr lang="fr-FR" dirty="0" err="1"/>
+              <a:t>processing</a:t>
+            </a:r>
             <a:endParaRPr lang="fr-FR" dirty="0"/>
           </a:p>
         </p:txBody>
@@ -1243,7 +1454,7 @@
           <a:p>
             <a:fld id="{D6DE7155-B76A-40FC-9D02-406774D50C88}" type="slidenum">
               <a:rPr lang="fr-FR" smtClean="0"/>
-              <a:t>11</a:t>
+              <a:t>9</a:t>
             </a:fld>
             <a:endParaRPr lang="fr-FR"/>
           </a:p>
@@ -1252,7 +1463,7 @@
     </p:spTree>
     <p:extLst>
       <p:ext uri="{BB962C8B-B14F-4D97-AF65-F5344CB8AC3E}">
-        <p14:creationId xmlns:p14="http://schemas.microsoft.com/office/powerpoint/2010/main" val="1468280270"/>
+        <p14:creationId xmlns:p14="http://schemas.microsoft.com/office/powerpoint/2010/main" val="2982545460"/>
       </p:ext>
     </p:extLst>
   </p:cSld>
@@ -1306,40 +1517,7 @@
           <a:bodyPr/>
           <a:lstStyle/>
           <a:p>
-            <a:r>
-              <a:rPr lang="fr-FR" dirty="0"/>
-              <a:t>Dans un ensemble de document</a:t>
-            </a:r>
-            <a:r>
-              <a:rPr lang="fr-FR" b="1" u="sng" dirty="0"/>
-              <a:t>s</a:t>
-            </a:r>
-            <a:r>
-              <a:rPr lang="fr-FR" dirty="0"/>
-              <a:t>, </a:t>
-            </a:r>
-            <a:r>
-              <a:rPr lang="fr-FR" b="1" u="sng" dirty="0"/>
-              <a:t>1</a:t>
-            </a:r>
-            <a:r>
-              <a:rPr lang="fr-FR" dirty="0"/>
-              <a:t> Document = ensemble de Beta Topics</a:t>
-            </a:r>
-          </a:p>
-          <a:p>
-            <a:r>
-              <a:rPr lang="fr-FR" dirty="0"/>
-              <a:t>La distribution </a:t>
-            </a:r>
-            <a:r>
-              <a:rPr lang="fr-FR" dirty="0" err="1"/>
-              <a:t>Direichket</a:t>
-            </a:r>
-            <a:r>
-              <a:rPr lang="fr-FR" dirty="0"/>
-              <a:t> permet de représenter chaque documents en fonction de ces topics via une proba</a:t>
-            </a:r>
+            <a:endParaRPr lang="fr-FR" dirty="0"/>
           </a:p>
         </p:txBody>
       </p:sp>
@@ -1360,7 +1538,7 @@
           <a:p>
             <a:fld id="{D6DE7155-B76A-40FC-9D02-406774D50C88}" type="slidenum">
               <a:rPr lang="fr-FR" smtClean="0"/>
-              <a:t>13</a:t>
+              <a:t>10</a:t>
             </a:fld>
             <a:endParaRPr lang="fr-FR"/>
           </a:p>
@@ -1369,7 +1547,7 @@
     </p:spTree>
     <p:extLst>
       <p:ext uri="{BB962C8B-B14F-4D97-AF65-F5344CB8AC3E}">
-        <p14:creationId xmlns:p14="http://schemas.microsoft.com/office/powerpoint/2010/main" val="3293342090"/>
+        <p14:creationId xmlns:p14="http://schemas.microsoft.com/office/powerpoint/2010/main" val="165913331"/>
       </p:ext>
     </p:extLst>
   </p:cSld>
@@ -1423,31 +1601,6 @@
           <a:bodyPr/>
           <a:lstStyle/>
           <a:p>
-            <a:r>
-              <a:rPr lang="fr-FR" sz="1200" b="0" i="0" kern="1200" dirty="0">
-                <a:solidFill>
-                  <a:schemeClr val="tx1"/>
-                </a:solidFill>
-                <a:effectLst/>
-                <a:latin typeface="+mn-lt"/>
-                <a:ea typeface="+mn-ea"/>
-                <a:cs typeface="+mn-cs"/>
-              </a:rPr>
-              <a:t>Source: </a:t>
-            </a:r>
-            <a:r>
-              <a:rPr lang="fr-FR" sz="1200" b="0" i="0" u="none" strike="noStrike" kern="1200" dirty="0">
-                <a:solidFill>
-                  <a:schemeClr val="tx1"/>
-                </a:solidFill>
-                <a:effectLst/>
-                <a:latin typeface="+mn-lt"/>
-                <a:ea typeface="+mn-ea"/>
-                <a:cs typeface="+mn-cs"/>
-                <a:hlinkClick r:id="rId3"/>
-              </a:rPr>
-              <a:t>https://www.researchgate.net/figure/Conceptual-illustration-of-non-negative-matrix-factorization-NMF-decomposition-of-a_fig1_312157184</a:t>
-            </a:r>
             <a:endParaRPr lang="fr-FR" dirty="0"/>
           </a:p>
         </p:txBody>
@@ -1469,7 +1622,7 @@
           <a:p>
             <a:fld id="{D6DE7155-B76A-40FC-9D02-406774D50C88}" type="slidenum">
               <a:rPr lang="fr-FR" smtClean="0"/>
-              <a:t>14</a:t>
+              <a:t>11</a:t>
             </a:fld>
             <a:endParaRPr lang="fr-FR"/>
           </a:p>
@@ -1478,7 +1631,7 @@
     </p:spTree>
     <p:extLst>
       <p:ext uri="{BB962C8B-B14F-4D97-AF65-F5344CB8AC3E}">
-        <p14:creationId xmlns:p14="http://schemas.microsoft.com/office/powerpoint/2010/main" val="3113831051"/>
+        <p14:creationId xmlns:p14="http://schemas.microsoft.com/office/powerpoint/2010/main" val="1468280270"/>
       </p:ext>
     </p:extLst>
   </p:cSld>
@@ -1732,7 +1885,7 @@
           <a:p>
             <a:fld id="{D902AEC4-4FE9-45EB-A4EF-FA36B3A084F8}" type="datetime1">
               <a:rPr lang="en-US" smtClean="0"/>
-              <a:t>7/18/2020</a:t>
+              <a:t>7/19/2020</a:t>
             </a:fld>
             <a:endParaRPr lang="en-US" dirty="0"/>
           </a:p>
@@ -1920,7 +2073,7 @@
           <a:p>
             <a:fld id="{DBCFB66A-836B-4A1C-8CCB-CBFD9812EF15}" type="datetime1">
               <a:rPr lang="en-US" smtClean="0"/>
-              <a:t>7/18/2020</a:t>
+              <a:t>7/19/2020</a:t>
             </a:fld>
             <a:endParaRPr lang="en-US" dirty="0"/>
           </a:p>
@@ -2162,7 +2315,7 @@
           <a:p>
             <a:fld id="{D4CE9563-DC5E-4D10-8193-9CC34A46C2F2}" type="datetime1">
               <a:rPr lang="en-US" smtClean="0"/>
-              <a:t>7/18/2020</a:t>
+              <a:t>7/19/2020</a:t>
             </a:fld>
             <a:endParaRPr lang="en-US" dirty="0"/>
           </a:p>
@@ -2350,7 +2503,7 @@
           <a:p>
             <a:fld id="{9E56ABF8-F5A8-4626-BA90-B0D5618993D9}" type="datetime1">
               <a:rPr lang="en-US" smtClean="0"/>
-              <a:t>7/18/2020</a:t>
+              <a:t>7/19/2020</a:t>
             </a:fld>
             <a:endParaRPr lang="en-US" dirty="0"/>
           </a:p>
@@ -2723,7 +2876,7 @@
           <a:p>
             <a:fld id="{F6513F32-818A-4F83-910C-D31BA95CDD69}" type="datetime1">
               <a:rPr lang="en-US" smtClean="0"/>
-              <a:t>7/18/2020</a:t>
+              <a:t>7/19/2020</a:t>
             </a:fld>
             <a:endParaRPr lang="en-US" dirty="0"/>
           </a:p>
@@ -2978,7 +3131,7 @@
           <a:p>
             <a:fld id="{65406327-4007-46A2-8A39-4F8CB0C934E0}" type="datetime1">
               <a:rPr lang="en-US" smtClean="0"/>
-              <a:t>7/18/2020</a:t>
+              <a:t>7/19/2020</a:t>
             </a:fld>
             <a:endParaRPr lang="en-US" dirty="0"/>
           </a:p>
@@ -3375,7 +3528,7 @@
           <a:p>
             <a:fld id="{4641B5CB-42E6-404C-B3B7-3C1DA405D779}" type="datetime1">
               <a:rPr lang="en-US" smtClean="0"/>
-              <a:t>7/18/2020</a:t>
+              <a:t>7/19/2020</a:t>
             </a:fld>
             <a:endParaRPr lang="en-US" dirty="0"/>
           </a:p>
@@ -3511,7 +3664,7 @@
           <a:p>
             <a:fld id="{D6CAB05C-59A2-41A7-B6B0-A84A7BA90CBF}" type="datetime1">
               <a:rPr lang="en-US" smtClean="0"/>
-              <a:t>7/18/2020</a:t>
+              <a:t>7/19/2020</a:t>
             </a:fld>
             <a:endParaRPr lang="en-US" dirty="0"/>
           </a:p>
@@ -3668,7 +3821,7 @@
           <a:p>
             <a:fld id="{047797E4-6503-4BAD-852F-980E7C1BDB0D}" type="datetime1">
               <a:rPr lang="en-US" smtClean="0"/>
-              <a:t>7/18/2020</a:t>
+              <a:t>7/19/2020</a:t>
             </a:fld>
             <a:endParaRPr lang="en-US" dirty="0"/>
           </a:p>
@@ -3997,7 +4150,7 @@
           <a:p>
             <a:fld id="{E0731B3A-E912-4717-B959-4CB37D98FE65}" type="datetime1">
               <a:rPr lang="en-US" smtClean="0"/>
-              <a:t>7/18/2020</a:t>
+              <a:t>7/19/2020</a:t>
             </a:fld>
             <a:endParaRPr lang="en-US" dirty="0"/>
           </a:p>
@@ -4347,7 +4500,7 @@
           <a:p>
             <a:fld id="{CD275C82-CD41-4B1C-84DA-13DE6BA0DA35}" type="datetime1">
               <a:rPr lang="en-US" smtClean="0"/>
-              <a:t>7/18/2020</a:t>
+              <a:t>7/19/2020</a:t>
             </a:fld>
             <a:endParaRPr lang="en-US" dirty="0"/>
           </a:p>
@@ -4608,7 +4761,7 @@
           <a:p>
             <a:fld id="{00C5D999-C4CF-4779-970D-58A676112007}" type="datetime1">
               <a:rPr lang="en-US" smtClean="0"/>
-              <a:t>7/18/2020</a:t>
+              <a:t>7/19/2020</a:t>
             </a:fld>
             <a:endParaRPr lang="en-US" dirty="0"/>
           </a:p>
@@ -5540,6 +5693,17 @@
               <a:buFont typeface="Arial" panose="020F0502020204030204" pitchFamily="34" charset="0"/>
               <a:buChar char="•"/>
             </a:pPr>
+            <a:endParaRPr lang="fr-FR" dirty="0">
+              <a:solidFill>
+                <a:schemeClr val="tx1"/>
+              </a:solidFill>
+            </a:endParaRPr>
+          </a:p>
+          <a:p>
+            <a:pPr marL="285750" indent="-285750">
+              <a:buFont typeface="Arial" panose="020F0502020204030204" pitchFamily="34" charset="0"/>
+              <a:buChar char="•"/>
+            </a:pPr>
             <a:r>
               <a:rPr lang="fr-FR" dirty="0">
                 <a:solidFill>
@@ -5575,47 +5739,39 @@
             </a:r>
           </a:p>
           <a:p>
-            <a:pPr lvl="1">
-              <a:buFont typeface="Arial" panose="020F0502020204030204" pitchFamily="34" charset="0"/>
+            <a:pPr marL="578358" lvl="1" indent="-285750">
+              <a:buFont typeface="Arial,Sans-Serif"/>
               <a:buChar char="•"/>
             </a:pPr>
+            <a:r>
+              <a:rPr lang="fr-FR" dirty="0"/>
+              <a:t>Bag of </a:t>
+            </a:r>
+            <a:r>
+              <a:rPr lang="fr-FR" dirty="0" err="1"/>
+              <a:t>Words</a:t>
+            </a:r>
+            <a:r>
+              <a:rPr lang="fr-FR" dirty="0"/>
+              <a:t> (Mots les plus fréquents)</a:t>
+            </a:r>
+          </a:p>
+          <a:p>
+            <a:pPr marL="578358" lvl="1" indent="-285750">
+              <a:buFont typeface="Arial,Sans-Serif"/>
+              <a:buChar char="•"/>
+            </a:pPr>
+            <a:r>
+              <a:rPr lang="fr-FR" dirty="0"/>
+              <a:t>TF-IDF (</a:t>
+            </a:r>
             <a:r>
               <a:rPr lang="fr-FR" dirty="0">
                 <a:solidFill>
                   <a:schemeClr val="tx1"/>
                 </a:solidFill>
               </a:rPr>
-              <a:t>Bag of </a:t>
-            </a:r>
-            <a:r>
-              <a:rPr lang="fr-FR" dirty="0" err="1">
-                <a:solidFill>
-                  <a:schemeClr val="tx1"/>
-                </a:solidFill>
-              </a:rPr>
-              <a:t>Words</a:t>
-            </a:r>
-            <a:r>
-              <a:rPr lang="fr-FR" dirty="0">
-                <a:solidFill>
-                  <a:schemeClr val="tx1"/>
-                </a:solidFill>
-              </a:rPr>
-              <a:t> (Mots les plus fréquents)</a:t>
-            </a:r>
-          </a:p>
-          <a:p>
-            <a:pPr lvl="1">
-              <a:buFont typeface="Arial" panose="020F0502020204030204" pitchFamily="34" charset="0"/>
-              <a:buChar char="•"/>
-            </a:pPr>
-            <a:r>
-              <a:rPr lang="fr-FR" dirty="0">
-                <a:solidFill>
-                  <a:schemeClr val="tx1"/>
-                </a:solidFill>
-              </a:rPr>
-              <a:t>TF-IDF (Mots les plus significatifs)</a:t>
+              <a:t>Mots les plus significatifs)</a:t>
             </a:r>
           </a:p>
           <a:p>
@@ -6196,6 +6352,20 @@
         <p:txBody>
           <a:bodyPr/>
           <a:lstStyle/>
+          <a:p>
+            <a:pPr marL="285750" indent="-285750">
+              <a:buFont typeface="Arial,Sans-Serif"/>
+              <a:buChar char="•"/>
+            </a:pPr>
+            <a:endParaRPr lang="fr-FR" dirty="0"/>
+          </a:p>
+          <a:p>
+            <a:pPr marL="285750" indent="-285750">
+              <a:buFont typeface="Arial,Sans-Serif"/>
+              <a:buChar char="•"/>
+            </a:pPr>
+            <a:endParaRPr lang="fr-FR" dirty="0"/>
+          </a:p>
           <a:p>
             <a:pPr marL="285750" indent="-285750">
               <a:buFont typeface="Arial,Sans-Serif"/>
@@ -7037,15 +7207,6 @@
               <a:srgbClr val="FFFFFF"/>
             </a:contourClr>
           </a:sp3d>
-          <a:extLst>
-            <a:ext uri="{909E8E84-426E-40DD-AFC4-6F175D3DCCD1}">
-              <a14:hiddenFill xmlns:a14="http://schemas.microsoft.com/office/drawing/2010/main">
-                <a:solidFill>
-                  <a:srgbClr val="FFFFFF"/>
-                </a:solidFill>
-              </a14:hiddenFill>
-            </a:ext>
-          </a:extLst>
         </p:spPr>
       </p:pic>
       <p:sp>
@@ -7247,20 +7408,14 @@
               <a:buFont typeface="Arial,Sans-Serif"/>
               <a:buChar char="•"/>
             </a:pPr>
-            <a:r>
-              <a:rPr lang="fr-FR" dirty="0"/>
-              <a:t>Nouveaux thèmes</a:t>
-            </a:r>
+            <a:endParaRPr lang="fr-FR" dirty="0"/>
           </a:p>
           <a:p>
             <a:pPr marL="285750" indent="-285750">
               <a:buFont typeface="Arial,Sans-Serif"/>
               <a:buChar char="•"/>
             </a:pPr>
-            <a:r>
-              <a:rPr lang="fr-FR" dirty="0"/>
-              <a:t>Besoin de nouveaux tags</a:t>
-            </a:r>
+            <a:endParaRPr lang="fr-FR" dirty="0"/>
           </a:p>
           <a:p>
             <a:pPr marL="285750" indent="-285750">
@@ -7269,7 +7424,41 @@
             </a:pPr>
             <a:r>
               <a:rPr lang="fr-FR" dirty="0"/>
-              <a:t>Besoin de conserver les tags existants</a:t>
+              <a:t>Nouveaux thèmes</a:t>
+            </a:r>
+          </a:p>
+          <a:p>
+            <a:pPr marL="285750" indent="-285750">
+              <a:buFont typeface="Arial,Sans-Serif"/>
+              <a:buChar char="•"/>
+            </a:pPr>
+            <a:endParaRPr lang="fr-FR" dirty="0"/>
+          </a:p>
+          <a:p>
+            <a:pPr marL="285750" indent="-285750">
+              <a:buFont typeface="Arial,Sans-Serif"/>
+              <a:buChar char="•"/>
+            </a:pPr>
+            <a:r>
+              <a:rPr lang="fr-FR" dirty="0"/>
+              <a:t>Nouveaux tags</a:t>
+            </a:r>
+          </a:p>
+          <a:p>
+            <a:pPr marL="285750" indent="-285750">
+              <a:buFont typeface="Arial,Sans-Serif"/>
+              <a:buChar char="•"/>
+            </a:pPr>
+            <a:endParaRPr lang="fr-FR" dirty="0"/>
+          </a:p>
+          <a:p>
+            <a:pPr marL="285750" indent="-285750">
+              <a:buFont typeface="Arial,Sans-Serif"/>
+              <a:buChar char="•"/>
+            </a:pPr>
+            <a:r>
+              <a:rPr lang="fr-FR" dirty="0"/>
+              <a:t>Conserver les tags existants</a:t>
             </a:r>
           </a:p>
         </p:txBody>
@@ -7608,6 +7797,14 @@
 <file path=ppt/slides/slide2.xml><?xml version="1.0" encoding="utf-8"?>
 <p:sld xmlns:a="http://schemas.openxmlformats.org/drawingml/2006/main" xmlns:r="http://schemas.openxmlformats.org/officeDocument/2006/relationships" xmlns:p="http://schemas.openxmlformats.org/presentationml/2006/main">
   <p:cSld>
+    <p:bg>
+      <p:bgPr>
+        <a:solidFill>
+          <a:schemeClr val="bg1"/>
+        </a:solidFill>
+        <a:effectLst/>
+      </p:bgPr>
+    </p:bg>
     <p:spTree>
       <p:nvGrpSpPr>
         <p:cNvPr id="1" name=""/>
@@ -7622,6 +7819,121 @@
           <a:chExt cx="0" cy="0"/>
         </a:xfrm>
       </p:grpSpPr>
+      <p:sp useBgFill="1">
+        <p:nvSpPr>
+          <p:cNvPr id="9" name="Rectangle 8">
+            <a:extLst>
+              <a:ext uri="{FF2B5EF4-FFF2-40B4-BE49-F238E27FC236}">
+                <a16:creationId xmlns:a16="http://schemas.microsoft.com/office/drawing/2014/main" id="{3741B58E-3B65-4A01-A276-975AB2CF8A08}"/>
+              </a:ext>
+              <a:ext uri="{C183D7F6-B498-43B3-948B-1728B52AA6E4}">
+                <adec:decorative xmlns:adec="http://schemas.microsoft.com/office/drawing/2017/decorative" val="1"/>
+              </a:ext>
+            </a:extLst>
+          </p:cNvPr>
+          <p:cNvSpPr>
+            <a:spLocks noGrp="1" noRot="1" noChangeAspect="1" noMove="1" noResize="1" noEditPoints="1" noAdjustHandles="1" noChangeArrowheads="1" noChangeShapeType="1" noTextEdit="1"/>
+          </p:cNvSpPr>
+          <p:nvPr>
+            <p:extLst>
+              <p:ext uri="{386F3935-93C4-4BCD-93E2-E3B085C9AB24}">
+                <p16:designElem xmlns:p16="http://schemas.microsoft.com/office/powerpoint/2015/main" val="1"/>
+              </p:ext>
+            </p:extLst>
+          </p:nvPr>
+        </p:nvSpPr>
+        <p:spPr>
+          <a:xfrm>
+            <a:off x="0" y="0"/>
+            <a:ext cx="12186315" cy="6858000"/>
+          </a:xfrm>
+          <a:prstGeom prst="rect">
+            <a:avLst/>
+          </a:prstGeom>
+          <a:ln>
+            <a:noFill/>
+          </a:ln>
+        </p:spPr>
+        <p:style>
+          <a:lnRef idx="2">
+            <a:schemeClr val="accent6">
+              <a:shade val="50000"/>
+            </a:schemeClr>
+          </a:lnRef>
+          <a:fillRef idx="1001">
+            <a:schemeClr val="lt1"/>
+          </a:fillRef>
+          <a:effectRef idx="0">
+            <a:schemeClr val="accent6"/>
+          </a:effectRef>
+          <a:fontRef idx="minor">
+            <a:schemeClr val="lt1"/>
+          </a:fontRef>
+        </p:style>
+        <p:txBody>
+          <a:bodyPr rtlCol="0" anchor="ctr"/>
+          <a:lstStyle/>
+          <a:p>
+            <a:pPr algn="ctr"/>
+            <a:endParaRPr lang="en-US"/>
+          </a:p>
+        </p:txBody>
+      </p:sp>
+      <p:sp>
+        <p:nvSpPr>
+          <p:cNvPr id="11" name="Rectangle 10">
+            <a:extLst>
+              <a:ext uri="{FF2B5EF4-FFF2-40B4-BE49-F238E27FC236}">
+                <a16:creationId xmlns:a16="http://schemas.microsoft.com/office/drawing/2014/main" id="{7AAC67C3-831B-4AB1-A259-DFB839CAFAFC}"/>
+              </a:ext>
+              <a:ext uri="{C183D7F6-B498-43B3-948B-1728B52AA6E4}">
+                <adec:decorative xmlns:adec="http://schemas.microsoft.com/office/drawing/2017/decorative" val="1"/>
+              </a:ext>
+            </a:extLst>
+          </p:cNvPr>
+          <p:cNvSpPr>
+            <a:spLocks noGrp="1" noRot="1" noChangeAspect="1" noMove="1" noResize="1" noEditPoints="1" noAdjustHandles="1" noChangeArrowheads="1" noChangeShapeType="1" noTextEdit="1"/>
+          </p:cNvSpPr>
+          <p:nvPr>
+            <p:extLst>
+              <p:ext uri="{386F3935-93C4-4BCD-93E2-E3B085C9AB24}">
+                <p16:designElem xmlns:p16="http://schemas.microsoft.com/office/powerpoint/2015/main" val="1"/>
+              </p:ext>
+            </p:extLst>
+          </p:nvPr>
+        </p:nvSpPr>
+        <p:spPr>
+          <a:xfrm>
+            <a:off x="16" y="0"/>
+            <a:ext cx="4648593" cy="6858000"/>
+          </a:xfrm>
+          <a:prstGeom prst="rect">
+            <a:avLst/>
+          </a:prstGeom>
+          <a:solidFill>
+            <a:srgbClr val="262626"/>
+          </a:solidFill>
+          <a:ln>
+            <a:noFill/>
+          </a:ln>
+        </p:spPr>
+        <p:style>
+          <a:lnRef idx="2">
+            <a:schemeClr val="accent1">
+              <a:shade val="50000"/>
+            </a:schemeClr>
+          </a:lnRef>
+          <a:fillRef idx="1">
+            <a:schemeClr val="accent1"/>
+          </a:fillRef>
+          <a:effectRef idx="0">
+            <a:schemeClr val="accent1"/>
+          </a:effectRef>
+          <a:fontRef idx="minor">
+            <a:schemeClr val="lt1"/>
+          </a:fontRef>
+        </p:style>
+      </p:sp>
       <p:sp>
         <p:nvSpPr>
           <p:cNvPr id="2" name="Titre 1">
@@ -7638,124 +7950,208 @@
             <p:ph type="title"/>
           </p:nvPr>
         </p:nvSpPr>
-        <p:spPr/>
-        <p:txBody>
-          <a:bodyPr/>
-          <a:lstStyle/>
-          <a:p>
-            <a:pPr algn="ctr"/>
-            <a:r>
-              <a:rPr lang="fr-FR" dirty="0"/>
-              <a:t>Sommaire</a:t>
-            </a:r>
-          </a:p>
-        </p:txBody>
-      </p:sp>
-      <p:sp>
-        <p:nvSpPr>
-          <p:cNvPr id="3" name="Espace réservé du contenu 2">
-            <a:extLst>
-              <a:ext uri="{FF2B5EF4-FFF2-40B4-BE49-F238E27FC236}">
-                <a16:creationId xmlns:a16="http://schemas.microsoft.com/office/drawing/2014/main" id="{C4246EF2-F872-4F8C-AD7C-C954689E198C}"/>
-              </a:ext>
-            </a:extLst>
-          </p:cNvPr>
-          <p:cNvSpPr>
-            <a:spLocks noGrp="1"/>
-          </p:cNvSpPr>
-          <p:nvPr>
-            <p:ph idx="1"/>
-          </p:nvPr>
-        </p:nvSpPr>
-        <p:spPr/>
-        <p:txBody>
-          <a:bodyPr vert="horz" lIns="0" tIns="45720" rIns="0" bIns="45720" rtlCol="0" anchor="t">
+        <p:spPr>
+          <a:xfrm>
+            <a:off x="492369" y="605896"/>
+            <a:ext cx="3642309" cy="5646208"/>
+          </a:xfrm>
+        </p:spPr>
+        <p:txBody>
+          <a:bodyPr anchor="ctr">
             <a:normAutofit/>
           </a:bodyPr>
           <a:lstStyle/>
           <a:p>
+            <a:r>
+              <a:rPr lang="fr-FR">
+                <a:solidFill>
+                  <a:srgbClr val="FFFFFF"/>
+                </a:solidFill>
+              </a:rPr>
+              <a:t>Sommaire</a:t>
+            </a:r>
+          </a:p>
+        </p:txBody>
+      </p:sp>
+      <p:sp>
+        <p:nvSpPr>
+          <p:cNvPr id="3" name="Espace réservé du contenu 2">
+            <a:extLst>
+              <a:ext uri="{FF2B5EF4-FFF2-40B4-BE49-F238E27FC236}">
+                <a16:creationId xmlns:a16="http://schemas.microsoft.com/office/drawing/2014/main" id="{C4246EF2-F872-4F8C-AD7C-C954689E198C}"/>
+              </a:ext>
+            </a:extLst>
+          </p:cNvPr>
+          <p:cNvSpPr>
+            <a:spLocks noGrp="1"/>
+          </p:cNvSpPr>
+          <p:nvPr>
+            <p:ph idx="1"/>
+          </p:nvPr>
+        </p:nvSpPr>
+        <p:spPr>
+          <a:xfrm>
+            <a:off x="5231958" y="605896"/>
+            <a:ext cx="5923721" cy="5646208"/>
+          </a:xfrm>
+        </p:spPr>
+        <p:txBody>
+          <a:bodyPr vert="horz" lIns="0" tIns="45720" rIns="0" bIns="45720" rtlCol="0" anchor="ctr">
+            <a:normAutofit/>
+          </a:bodyPr>
+          <a:lstStyle/>
+          <a:p>
+            <a:pPr marL="285750" indent="-285750">
+              <a:buFont typeface="Arial,Sans-Serif"/>
+              <a:buChar char="•"/>
+            </a:pPr>
+            <a:endParaRPr lang="fr-FR" dirty="0"/>
+          </a:p>
+          <a:p>
+            <a:pPr marL="285750" indent="-285750">
+              <a:buFont typeface="Arial,Sans-Serif"/>
+              <a:buChar char="•"/>
+            </a:pPr>
+            <a:r>
+              <a:rPr lang="fr-FR" dirty="0"/>
+              <a:t>Contexte et Objectifs</a:t>
+            </a:r>
+          </a:p>
+          <a:p>
+            <a:pPr marL="285750" indent="-285750">
+              <a:buFont typeface="Arial,Sans-Serif"/>
+              <a:buChar char="•"/>
+            </a:pPr>
+            <a:endParaRPr lang="fr-FR" dirty="0"/>
+          </a:p>
+          <a:p>
+            <a:pPr marL="285750" indent="-285750">
+              <a:buFont typeface="Arial,Sans-Serif"/>
+              <a:buChar char="•"/>
+            </a:pPr>
+            <a:r>
+              <a:rPr lang="fr-FR" dirty="0"/>
+              <a:t>Sélection des données</a:t>
+            </a:r>
+          </a:p>
+          <a:p>
+            <a:pPr marL="285750" indent="-285750">
+              <a:buFont typeface="Arial,Sans-Serif"/>
+              <a:buChar char="•"/>
+            </a:pPr>
+            <a:endParaRPr lang="fr-FR" dirty="0"/>
+          </a:p>
+          <a:p>
+            <a:pPr marL="285750" indent="-285750">
+              <a:buFont typeface="Arial,Sans-Serif"/>
+              <a:buChar char="•"/>
+            </a:pPr>
+            <a:r>
+              <a:rPr lang="fr-FR" dirty="0"/>
+              <a:t>Data </a:t>
+            </a:r>
+            <a:r>
+              <a:rPr lang="fr-FR" dirty="0" err="1"/>
+              <a:t>engeenering</a:t>
+            </a:r>
+            <a:endParaRPr lang="fr-FR" dirty="0"/>
+          </a:p>
+          <a:p>
+            <a:pPr marL="285750" indent="-285750">
+              <a:buFont typeface="Arial,Sans-Serif"/>
+              <a:buChar char="•"/>
+            </a:pPr>
+            <a:endParaRPr lang="fr-FR" dirty="0"/>
+          </a:p>
+          <a:p>
+            <a:pPr marL="285750" indent="-285750">
+              <a:buFont typeface="Arial,Sans-Serif"/>
+              <a:buChar char="•"/>
+            </a:pPr>
+            <a:r>
+              <a:rPr lang="fr-FR" dirty="0"/>
+              <a:t>Génération tags</a:t>
+            </a:r>
+          </a:p>
+          <a:p>
+            <a:pPr marL="285750" indent="-285750">
+              <a:buFont typeface="Arial,Sans-Serif"/>
+              <a:buChar char="•"/>
+            </a:pPr>
+            <a:endParaRPr lang="fr-FR" dirty="0"/>
+          </a:p>
+          <a:p>
+            <a:pPr marL="285750" indent="-285750">
+              <a:buFont typeface="Arial,Sans-Serif"/>
+              <a:buChar char="•"/>
+            </a:pPr>
+            <a:r>
+              <a:rPr lang="fr-FR" dirty="0"/>
+              <a:t>Résultats</a:t>
+            </a:r>
+          </a:p>
+          <a:p>
+            <a:endParaRPr lang="fr-FR" sz="2400" dirty="0"/>
+          </a:p>
+        </p:txBody>
+      </p:sp>
+      <p:sp>
+        <p:nvSpPr>
+          <p:cNvPr id="4" name="Espace réservé du numéro de diapositive 3">
+            <a:extLst>
+              <a:ext uri="{FF2B5EF4-FFF2-40B4-BE49-F238E27FC236}">
+                <a16:creationId xmlns:a16="http://schemas.microsoft.com/office/drawing/2014/main" id="{C43FA52C-2E14-43D1-B5C6-6633A1372F8A}"/>
+              </a:ext>
+            </a:extLst>
+          </p:cNvPr>
+          <p:cNvSpPr>
+            <a:spLocks noGrp="1"/>
+          </p:cNvSpPr>
+          <p:nvPr>
+            <p:ph type="sldNum" sz="quarter" idx="12"/>
+          </p:nvPr>
+        </p:nvSpPr>
+        <p:spPr>
+          <a:xfrm>
+            <a:off x="10993582" y="6446838"/>
+            <a:ext cx="780010" cy="365125"/>
+          </a:xfrm>
+        </p:spPr>
+        <p:txBody>
+          <a:bodyPr>
+            <a:normAutofit/>
+          </a:bodyPr>
+          <a:lstStyle/>
+          <a:p>
             <a:pPr>
-              <a:buFont typeface="Arial" panose="020F0502020204030204" pitchFamily="34" charset="0"/>
-              <a:buChar char="•"/>
-            </a:pPr>
-            <a:r>
-              <a:rPr lang="fr-FR"/>
-              <a:t>Contexte et Objectifs</a:t>
-            </a:r>
-          </a:p>
-          <a:p>
-            <a:pPr>
-              <a:buFont typeface="Arial" panose="020F0502020204030204" pitchFamily="34" charset="0"/>
-              <a:buChar char="•"/>
-            </a:pPr>
-            <a:r>
-              <a:rPr lang="fr-FR"/>
-              <a:t>Sélection des données</a:t>
-            </a:r>
-          </a:p>
-          <a:p>
-            <a:pPr>
-              <a:buFont typeface="Arial" panose="020F0502020204030204" pitchFamily="34" charset="0"/>
-              <a:buChar char="•"/>
-            </a:pPr>
-            <a:r>
-              <a:rPr lang="fr-FR"/>
-              <a:t>Data engeenering</a:t>
-            </a:r>
-            <a:endParaRPr lang="fr-FR" dirty="0"/>
-          </a:p>
-          <a:p>
-            <a:pPr>
-              <a:buFont typeface="Arial" panose="020F0502020204030204" pitchFamily="34" charset="0"/>
-              <a:buChar char="•"/>
-            </a:pPr>
-            <a:r>
-              <a:rPr lang="fr-FR"/>
-              <a:t>Génération tags</a:t>
-            </a:r>
-          </a:p>
-          <a:p>
-            <a:pPr>
-              <a:buFont typeface="Arial" panose="020F0502020204030204" pitchFamily="34" charset="0"/>
-              <a:buChar char="•"/>
-            </a:pPr>
-            <a:r>
-              <a:rPr lang="fr-FR"/>
-              <a:t>Résultat</a:t>
-            </a:r>
-            <a:endParaRPr lang="fr-FR" dirty="0"/>
-          </a:p>
-          <a:p>
-            <a:endParaRPr lang="fr-FR" dirty="0"/>
-          </a:p>
-        </p:txBody>
-      </p:sp>
-      <p:sp>
-        <p:nvSpPr>
-          <p:cNvPr id="4" name="Espace réservé du numéro de diapositive 3">
-            <a:extLst>
-              <a:ext uri="{FF2B5EF4-FFF2-40B4-BE49-F238E27FC236}">
-                <a16:creationId xmlns:a16="http://schemas.microsoft.com/office/drawing/2014/main" id="{C43FA52C-2E14-43D1-B5C6-6633A1372F8A}"/>
-              </a:ext>
-            </a:extLst>
-          </p:cNvPr>
-          <p:cNvSpPr>
-            <a:spLocks noGrp="1"/>
-          </p:cNvSpPr>
-          <p:nvPr>
-            <p:ph type="sldNum" sz="quarter" idx="12"/>
-          </p:nvPr>
-        </p:nvSpPr>
-        <p:spPr/>
-        <p:txBody>
-          <a:bodyPr/>
-          <a:lstStyle/>
-          <a:p>
+              <a:spcAft>
+                <a:spcPts val="600"/>
+              </a:spcAft>
+            </a:pPr>
             <a:fld id="{3A98EE3D-8CD1-4C3F-BD1C-C98C9596463C}" type="slidenum">
-              <a:rPr lang="en-US" smtClean="0"/>
+              <a:rPr lang="en-US">
+                <a:solidFill>
+                  <a:schemeClr val="tx1">
+                    <a:lumMod val="85000"/>
+                    <a:lumOff val="15000"/>
+                  </a:schemeClr>
+                </a:solidFill>
+              </a:rPr>
+              <a:pPr>
+                <a:spcAft>
+                  <a:spcPts val="600"/>
+                </a:spcAft>
+              </a:pPr>
               <a:t>2</a:t>
             </a:fld>
-            <a:endParaRPr lang="en-US" dirty="0"/>
+            <a:endParaRPr lang="en-US">
+              <a:solidFill>
+                <a:schemeClr val="tx1">
+                  <a:lumMod val="85000"/>
+                  <a:lumOff val="15000"/>
+                </a:schemeClr>
+              </a:solidFill>
+            </a:endParaRPr>
           </a:p>
         </p:txBody>
       </p:sp>
@@ -7794,7 +8190,7 @@
           <p:cNvPr id="2" name="Titre 1">
             <a:extLst>
               <a:ext uri="{FF2B5EF4-FFF2-40B4-BE49-F238E27FC236}">
-                <a16:creationId xmlns:a16="http://schemas.microsoft.com/office/drawing/2014/main" id="{CC813B72-CC57-4EBD-84B9-16C5D707F04A}"/>
+                <a16:creationId xmlns:a16="http://schemas.microsoft.com/office/drawing/2014/main" id="{6F814F5A-0912-4B8E-9A02-D9B05AE28C95}"/>
               </a:ext>
             </a:extLst>
           </p:cNvPr>
@@ -7819,33 +8215,39 @@
       </p:sp>
       <p:sp>
         <p:nvSpPr>
-          <p:cNvPr id="3" name="Espace réservé du contenu 2">
-            <a:extLst>
-              <a:ext uri="{FF2B5EF4-FFF2-40B4-BE49-F238E27FC236}">
-                <a16:creationId xmlns:a16="http://schemas.microsoft.com/office/drawing/2014/main" id="{347D56E0-6FE8-477F-9959-CE7AE9C29C58}"/>
-              </a:ext>
-            </a:extLst>
-          </p:cNvPr>
-          <p:cNvSpPr>
-            <a:spLocks noGrp="1"/>
-          </p:cNvSpPr>
-          <p:nvPr>
-            <p:ph idx="1"/>
+          <p:cNvPr id="4" name="Espace réservé du texte 3">
+            <a:extLst>
+              <a:ext uri="{FF2B5EF4-FFF2-40B4-BE49-F238E27FC236}">
+                <a16:creationId xmlns:a16="http://schemas.microsoft.com/office/drawing/2014/main" id="{62C70781-C136-49C3-AEDE-C596C28ED99E}"/>
+              </a:ext>
+            </a:extLst>
+          </p:cNvPr>
+          <p:cNvSpPr>
+            <a:spLocks noGrp="1"/>
+          </p:cNvSpPr>
+          <p:nvPr>
+            <p:ph type="body" sz="half" idx="2"/>
           </p:nvPr>
         </p:nvSpPr>
         <p:spPr/>
         <p:txBody>
-          <a:bodyPr vert="horz" lIns="0" tIns="45720" rIns="0" bIns="45720" rtlCol="0" anchor="t">
+          <a:bodyPr vert="horz" lIns="91440" tIns="45720" rIns="91440" bIns="45720" rtlCol="0" anchor="t">
             <a:normAutofit/>
           </a:bodyPr>
           <a:lstStyle/>
           <a:p>
-            <a:pPr>
-              <a:buFont typeface="Arial" panose="020F0502020204030204" pitchFamily="34" charset="0"/>
+            <a:pPr marL="285750" indent="-285750">
+              <a:lnSpc>
+                <a:spcPct val="100000"/>
+              </a:lnSpc>
+              <a:buFont typeface="Calibri,Sans-Serif" panose="020F0502020204030204" pitchFamily="34" charset="0"/>
               <a:buChar char="•"/>
             </a:pPr>
             <a:r>
               <a:rPr lang="fr-FR" dirty="0">
+                <a:solidFill>
+                  <a:schemeClr val="bg1"/>
+                </a:solidFill>
                 <a:ea typeface="+mn-lt"/>
                 <a:cs typeface="+mn-lt"/>
               </a:rPr>
@@ -7853,20 +8255,35 @@
             </a:r>
             <a:r>
               <a:rPr lang="fr-FR" dirty="0" err="1">
+                <a:solidFill>
+                  <a:schemeClr val="bg1"/>
+                </a:solidFill>
                 <a:ea typeface="+mn-lt"/>
                 <a:cs typeface="+mn-lt"/>
               </a:rPr>
               <a:t>Overflow</a:t>
             </a:r>
-            <a:endParaRPr lang="fr-FR" dirty="0" err="1"/>
-          </a:p>
-          <a:p>
-            <a:pPr>
-              <a:buFont typeface="Arial" panose="020F0502020204030204" pitchFamily="34" charset="0"/>
+            <a:endParaRPr lang="fr-FR" dirty="0">
+              <a:solidFill>
+                <a:schemeClr val="bg1"/>
+              </a:solidFill>
+              <a:ea typeface="+mn-lt"/>
+              <a:cs typeface="+mn-lt"/>
+            </a:endParaRPr>
+          </a:p>
+          <a:p>
+            <a:pPr marL="285750" indent="-285750">
+              <a:lnSpc>
+                <a:spcPct val="100000"/>
+              </a:lnSpc>
+              <a:buFont typeface="Calibri,Sans-Serif" panose="020F0502020204030204" pitchFamily="34" charset="0"/>
               <a:buChar char="•"/>
             </a:pPr>
             <a:r>
               <a:rPr lang="fr-FR" dirty="0">
+                <a:solidFill>
+                  <a:schemeClr val="bg1"/>
+                </a:solidFill>
                 <a:ea typeface="+mn-lt"/>
                 <a:cs typeface="+mn-lt"/>
               </a:rPr>
@@ -7874,12 +8291,18 @@
             </a:r>
           </a:p>
           <a:p>
-            <a:pPr>
-              <a:buFont typeface="Arial" panose="020F0502020204030204" pitchFamily="34" charset="0"/>
+            <a:pPr marL="285750" indent="-285750">
+              <a:lnSpc>
+                <a:spcPct val="100000"/>
+              </a:lnSpc>
+              <a:buFont typeface="Calibri,Sans-Serif" panose="020F0502020204030204" pitchFamily="34" charset="0"/>
               <a:buChar char="•"/>
             </a:pPr>
             <a:r>
               <a:rPr lang="fr-FR" dirty="0">
+                <a:solidFill>
+                  <a:schemeClr val="bg1"/>
+                </a:solidFill>
                 <a:ea typeface="+mn-lt"/>
                 <a:cs typeface="+mn-lt"/>
               </a:rPr>
@@ -7887,36 +8310,62 @@
             </a:r>
           </a:p>
           <a:p>
-            <a:pPr>
-              <a:buFont typeface="Arial" panose="020F0502020204030204" pitchFamily="34" charset="0"/>
+            <a:pPr marL="285750" indent="-285750">
+              <a:lnSpc>
+                <a:spcPct val="100000"/>
+              </a:lnSpc>
+              <a:buFont typeface="Calibri,Sans-Serif" panose="020F0502020204030204" pitchFamily="34" charset="0"/>
               <a:buChar char="•"/>
             </a:pPr>
             <a:r>
               <a:rPr lang="fr-FR" dirty="0">
+                <a:solidFill>
+                  <a:schemeClr val="bg1"/>
+                </a:solidFill>
                 <a:ea typeface="+mn-lt"/>
                 <a:cs typeface="+mn-lt"/>
               </a:rPr>
               <a:t>Tags</a:t>
             </a:r>
           </a:p>
-          <a:p>
-            <a:pPr marL="383540" lvl="1">
-              <a:buFont typeface="Arial" panose="020F0502020204030204" pitchFamily="34" charset="0"/>
-              <a:buChar char="•"/>
-            </a:pPr>
-            <a:endParaRPr lang="fr-FR" dirty="0">
-              <a:ea typeface="+mn-lt"/>
-              <a:cs typeface="+mn-lt"/>
-            </a:endParaRPr>
+        </p:txBody>
+      </p:sp>
+      <p:sp>
+        <p:nvSpPr>
+          <p:cNvPr id="3" name="Espace réservé du numéro de diapositive 2">
+            <a:extLst>
+              <a:ext uri="{FF2B5EF4-FFF2-40B4-BE49-F238E27FC236}">
+                <a16:creationId xmlns:a16="http://schemas.microsoft.com/office/drawing/2014/main" id="{29E68C2B-0C8C-4184-ACA5-62EFD12D4232}"/>
+              </a:ext>
+            </a:extLst>
+          </p:cNvPr>
+          <p:cNvSpPr>
+            <a:spLocks noGrp="1"/>
+          </p:cNvSpPr>
+          <p:nvPr>
+            <p:ph type="sldNum" sz="quarter" idx="12"/>
+          </p:nvPr>
+        </p:nvSpPr>
+        <p:spPr/>
+        <p:txBody>
+          <a:bodyPr/>
+          <a:lstStyle/>
+          <a:p>
+            <a:fld id="{3A98EE3D-8CD1-4C3F-BD1C-C98C9596463C}" type="slidenum">
+              <a:rPr lang="en-US" smtClean="0"/>
+              <a:pPr/>
+              <a:t>3</a:t>
+            </a:fld>
+            <a:endParaRPr lang="en-US" dirty="0"/>
           </a:p>
         </p:txBody>
       </p:sp>
       <p:pic>
         <p:nvPicPr>
-          <p:cNvPr id="4" name="Image 4">
-            <a:extLst>
-              <a:ext uri="{FF2B5EF4-FFF2-40B4-BE49-F238E27FC236}">
-                <a16:creationId xmlns:a16="http://schemas.microsoft.com/office/drawing/2014/main" id="{0809F0E6-9C89-401A-9F63-A32BB9654BB4}"/>
+          <p:cNvPr id="6" name="Image 4">
+            <a:extLst>
+              <a:ext uri="{FF2B5EF4-FFF2-40B4-BE49-F238E27FC236}">
+                <a16:creationId xmlns:a16="http://schemas.microsoft.com/office/drawing/2014/main" id="{8928E693-25F7-4A24-AA1C-F50DC7F9AF9D}"/>
               </a:ext>
             </a:extLst>
           </p:cNvPr>
@@ -7926,7 +8375,7 @@
           <p:nvPr/>
         </p:nvPicPr>
         <p:blipFill>
-          <a:blip r:embed="rId2"/>
+          <a:blip r:embed="rId3"/>
           <a:stretch>
             <a:fillRect/>
           </a:stretch>
@@ -7941,39 +8390,10 @@
           </a:prstGeom>
         </p:spPr>
       </p:pic>
-      <p:sp>
-        <p:nvSpPr>
-          <p:cNvPr id="5" name="Espace réservé du numéro de diapositive 4">
-            <a:extLst>
-              <a:ext uri="{FF2B5EF4-FFF2-40B4-BE49-F238E27FC236}">
-                <a16:creationId xmlns:a16="http://schemas.microsoft.com/office/drawing/2014/main" id="{F472A730-2C03-4EE8-8010-C0467EE0525C}"/>
-              </a:ext>
-            </a:extLst>
-          </p:cNvPr>
-          <p:cNvSpPr>
-            <a:spLocks noGrp="1"/>
-          </p:cNvSpPr>
-          <p:nvPr>
-            <p:ph type="sldNum" sz="quarter" idx="12"/>
-          </p:nvPr>
-        </p:nvSpPr>
-        <p:spPr/>
-        <p:txBody>
-          <a:bodyPr/>
-          <a:lstStyle/>
-          <a:p>
-            <a:fld id="{3A98EE3D-8CD1-4C3F-BD1C-C98C9596463C}" type="slidenum">
-              <a:rPr lang="en-US" smtClean="0"/>
-              <a:t>3</a:t>
-            </a:fld>
-            <a:endParaRPr lang="en-US" dirty="0"/>
-          </a:p>
-        </p:txBody>
-      </p:sp>
     </p:spTree>
     <p:extLst>
       <p:ext uri="{BB962C8B-B14F-4D97-AF65-F5344CB8AC3E}">
-        <p14:creationId xmlns:p14="http://schemas.microsoft.com/office/powerpoint/2010/main" val="3440900704"/>
+        <p14:creationId xmlns:p14="http://schemas.microsoft.com/office/powerpoint/2010/main" val="4177625436"/>
       </p:ext>
     </p:extLst>
   </p:cSld>
@@ -8005,7 +8425,7 @@
           <p:cNvPr id="2" name="Titre 1">
             <a:extLst>
               <a:ext uri="{FF2B5EF4-FFF2-40B4-BE49-F238E27FC236}">
-                <a16:creationId xmlns:a16="http://schemas.microsoft.com/office/drawing/2014/main" id="{08B72C4E-1672-4ED3-95DF-D7AF4B1847E6}"/>
+                <a16:creationId xmlns:a16="http://schemas.microsoft.com/office/drawing/2014/main" id="{6F814F5A-0912-4B8E-9A02-D9B05AE28C95}"/>
               </a:ext>
             </a:extLst>
           </p:cNvPr>
@@ -8022,38 +8442,40 @@
           <a:lstStyle/>
           <a:p>
             <a:r>
-              <a:rPr lang="fr-FR"/>
+              <a:rPr lang="fr-FR" dirty="0"/>
               <a:t>Objectif</a:t>
             </a:r>
-            <a:endParaRPr lang="fr-FR" dirty="0"/>
-          </a:p>
-        </p:txBody>
-      </p:sp>
-      <p:sp>
-        <p:nvSpPr>
-          <p:cNvPr id="3" name="Espace réservé du contenu 2">
-            <a:extLst>
-              <a:ext uri="{FF2B5EF4-FFF2-40B4-BE49-F238E27FC236}">
-                <a16:creationId xmlns:a16="http://schemas.microsoft.com/office/drawing/2014/main" id="{D60D88F1-DD1B-4336-B63F-22C781E9D695}"/>
-              </a:ext>
-            </a:extLst>
-          </p:cNvPr>
-          <p:cNvSpPr>
-            <a:spLocks noGrp="1"/>
-          </p:cNvSpPr>
-          <p:nvPr>
-            <p:ph idx="1"/>
+          </a:p>
+        </p:txBody>
+      </p:sp>
+      <p:sp>
+        <p:nvSpPr>
+          <p:cNvPr id="4" name="Espace réservé du texte 3">
+            <a:extLst>
+              <a:ext uri="{FF2B5EF4-FFF2-40B4-BE49-F238E27FC236}">
+                <a16:creationId xmlns:a16="http://schemas.microsoft.com/office/drawing/2014/main" id="{62C70781-C136-49C3-AEDE-C596C28ED99E}"/>
+              </a:ext>
+            </a:extLst>
+          </p:cNvPr>
+          <p:cNvSpPr>
+            <a:spLocks noGrp="1"/>
+          </p:cNvSpPr>
+          <p:nvPr>
+            <p:ph type="body" sz="half" idx="2"/>
           </p:nvPr>
         </p:nvSpPr>
         <p:spPr/>
         <p:txBody>
-          <a:bodyPr vert="horz" lIns="0" tIns="45720" rIns="0" bIns="45720" rtlCol="0" anchor="t">
+          <a:bodyPr vert="horz" lIns="91440" tIns="45720" rIns="91440" bIns="45720" rtlCol="0" anchor="t">
             <a:normAutofit/>
           </a:bodyPr>
           <a:lstStyle/>
           <a:p>
-            <a:pPr>
-              <a:buFont typeface="Arial,Sans-Serif" panose="020F0502020204030204" pitchFamily="34" charset="0"/>
+            <a:pPr marL="285750" indent="-285750">
+              <a:lnSpc>
+                <a:spcPct val="100000"/>
+              </a:lnSpc>
+              <a:buFont typeface="Calibri,Sans-Serif" panose="020F0502020204030204" pitchFamily="34" charset="0"/>
               <a:buChar char="•"/>
             </a:pPr>
             <a:r>
@@ -8061,7 +8483,7 @@
                 <a:ea typeface="+mn-lt"/>
                 <a:cs typeface="+mn-lt"/>
               </a:rPr>
-              <a:t>Système de suggestion de tag</a:t>
+              <a:t>Suggestion de tag</a:t>
             </a:r>
             <a:endParaRPr lang="en-US" dirty="0">
               <a:ea typeface="+mn-lt"/>
@@ -8069,8 +8491,11 @@
             </a:endParaRPr>
           </a:p>
           <a:p>
-            <a:pPr>
-              <a:buFont typeface="Arial,Sans-Serif" panose="020F0502020204030204" pitchFamily="34" charset="0"/>
+            <a:pPr marL="285750" indent="-285750">
+              <a:lnSpc>
+                <a:spcPct val="100000"/>
+              </a:lnSpc>
+              <a:buFont typeface="Calibri,Sans-Serif" panose="020F0502020204030204" pitchFamily="34" charset="0"/>
               <a:buChar char="•"/>
             </a:pPr>
             <a:r>
@@ -8080,14 +8505,17 @@
               </a:rPr>
               <a:t>Algorithmes de Machine Learning</a:t>
             </a:r>
-            <a:endParaRPr lang="en-US" dirty="0" err="1">
+            <a:endParaRPr lang="en-US" dirty="0">
               <a:ea typeface="+mn-lt"/>
               <a:cs typeface="+mn-lt"/>
             </a:endParaRPr>
           </a:p>
           <a:p>
-            <a:pPr>
-              <a:buFont typeface="Arial,Sans-Serif" panose="020F0502020204030204" pitchFamily="34" charset="0"/>
+            <a:pPr marL="285750" indent="-285750">
+              <a:lnSpc>
+                <a:spcPct val="100000"/>
+              </a:lnSpc>
+              <a:buFont typeface="Calibri,Sans-Serif" panose="020F0502020204030204" pitchFamily="34" charset="0"/>
               <a:buChar char="•"/>
             </a:pPr>
             <a:r>
@@ -8097,11 +8525,13 @@
               </a:rPr>
               <a:t>Multi tag</a:t>
             </a:r>
-            <a:endParaRPr lang="fr-FR" dirty="0"/>
-          </a:p>
-          <a:p>
-            <a:pPr>
-              <a:buFont typeface="Arial,Sans-Serif" panose="020F0502020204030204" pitchFamily="34" charset="0"/>
+          </a:p>
+          <a:p>
+            <a:pPr marL="285750" indent="-285750">
+              <a:lnSpc>
+                <a:spcPct val="100000"/>
+              </a:lnSpc>
+              <a:buFont typeface="Calibri,Sans-Serif" panose="020F0502020204030204" pitchFamily="34" charset="0"/>
               <a:buChar char="•"/>
             </a:pPr>
             <a:r>
@@ -8113,12 +8543,15 @@
             </a:r>
           </a:p>
           <a:p>
-            <a:pPr lvl="1">
-              <a:buFont typeface="Arial,Sans-Serif" panose="020F0502020204030204" pitchFamily="34" charset="0"/>
+            <a:pPr marL="742950" lvl="1" indent="-285750">
+              <a:buFont typeface="Calibri,Sans-Serif" panose="020F0502020204030204" pitchFamily="34" charset="0"/>
               <a:buChar char="•"/>
             </a:pPr>
             <a:r>
               <a:rPr lang="fr-FR" dirty="0">
+                <a:solidFill>
+                  <a:schemeClr val="bg1"/>
+                </a:solidFill>
                 <a:ea typeface="+mn-lt"/>
                 <a:cs typeface="+mn-lt"/>
               </a:rPr>
@@ -8126,34 +8559,64 @@
             </a:r>
           </a:p>
           <a:p>
-            <a:pPr lvl="1">
-              <a:buFont typeface="Arial,Sans-Serif" panose="020F0502020204030204" pitchFamily="34" charset="0"/>
+            <a:pPr marL="742950" lvl="1" indent="-285750">
+              <a:buFont typeface="Calibri,Sans-Serif" panose="020F0502020204030204" pitchFamily="34" charset="0"/>
               <a:buChar char="•"/>
             </a:pPr>
             <a:r>
               <a:rPr lang="fr-FR" dirty="0">
+                <a:solidFill>
+                  <a:schemeClr val="bg1"/>
+                </a:solidFill>
                 <a:ea typeface="+mn-lt"/>
                 <a:cs typeface="+mn-lt"/>
               </a:rPr>
               <a:t>Non supervisée.</a:t>
             </a:r>
-            <a:endParaRPr lang="fr-FR" dirty="0"/>
-          </a:p>
-          <a:p>
-            <a:pPr>
-              <a:buFont typeface="Arial,Sans-Serif" panose="020F0502020204030204" pitchFamily="34" charset="0"/>
-              <a:buChar char="•"/>
-            </a:pPr>
-            <a:endParaRPr lang="fr-FR" dirty="0"/>
+            <a:endParaRPr lang="fr-FR" dirty="0">
+              <a:solidFill>
+                <a:schemeClr val="bg1"/>
+              </a:solidFill>
+            </a:endParaRPr>
+          </a:p>
+        </p:txBody>
+      </p:sp>
+      <p:sp>
+        <p:nvSpPr>
+          <p:cNvPr id="3" name="Espace réservé du numéro de diapositive 2">
+            <a:extLst>
+              <a:ext uri="{FF2B5EF4-FFF2-40B4-BE49-F238E27FC236}">
+                <a16:creationId xmlns:a16="http://schemas.microsoft.com/office/drawing/2014/main" id="{29E68C2B-0C8C-4184-ACA5-62EFD12D4232}"/>
+              </a:ext>
+            </a:extLst>
+          </p:cNvPr>
+          <p:cNvSpPr>
+            <a:spLocks noGrp="1"/>
+          </p:cNvSpPr>
+          <p:nvPr>
+            <p:ph type="sldNum" sz="quarter" idx="12"/>
+          </p:nvPr>
+        </p:nvSpPr>
+        <p:spPr/>
+        <p:txBody>
+          <a:bodyPr/>
+          <a:lstStyle/>
+          <a:p>
+            <a:fld id="{3A98EE3D-8CD1-4C3F-BD1C-C98C9596463C}" type="slidenum">
+              <a:rPr lang="en-US" smtClean="0"/>
+              <a:pPr/>
+              <a:t>4</a:t>
+            </a:fld>
+            <a:endParaRPr lang="en-US" dirty="0"/>
           </a:p>
         </p:txBody>
       </p:sp>
       <p:pic>
         <p:nvPicPr>
-          <p:cNvPr id="4" name="Image 3" descr="Une image contenant miroir, table, tasse, dessin&#10;&#10;Description générée avec un niveau de confiance très élevé">
-            <a:extLst>
-              <a:ext uri="{FF2B5EF4-FFF2-40B4-BE49-F238E27FC236}">
-                <a16:creationId xmlns:a16="http://schemas.microsoft.com/office/drawing/2014/main" id="{11FBB976-0C2B-46E4-97A5-7745710857DC}"/>
+          <p:cNvPr id="6" name="Image 5" descr="Une image contenant miroir, table, tasse, dessin&#10;&#10;Description générée avec un niveau de confiance très élevé">
+            <a:extLst>
+              <a:ext uri="{FF2B5EF4-FFF2-40B4-BE49-F238E27FC236}">
+                <a16:creationId xmlns:a16="http://schemas.microsoft.com/office/drawing/2014/main" id="{A8EB863F-7F19-4955-86DC-A3D5EE92BB6B}"/>
               </a:ext>
             </a:extLst>
           </p:cNvPr>
@@ -8163,7 +8626,7 @@
           <p:nvPr/>
         </p:nvPicPr>
         <p:blipFill>
-          <a:blip r:embed="rId2"/>
+          <a:blip r:embed="rId3"/>
           <a:stretch>
             <a:fillRect/>
           </a:stretch>
@@ -8180,10 +8643,10 @@
       </p:pic>
       <p:sp>
         <p:nvSpPr>
-          <p:cNvPr id="5" name="Rectangle 4">
-            <a:extLst>
-              <a:ext uri="{FF2B5EF4-FFF2-40B4-BE49-F238E27FC236}">
-                <a16:creationId xmlns:a16="http://schemas.microsoft.com/office/drawing/2014/main" id="{3108D787-0E54-4985-93E8-532182FE45B7}"/>
+          <p:cNvPr id="8" name="Rectangle 7">
+            <a:extLst>
+              <a:ext uri="{FF2B5EF4-FFF2-40B4-BE49-F238E27FC236}">
+                <a16:creationId xmlns:a16="http://schemas.microsoft.com/office/drawing/2014/main" id="{DB79CA90-E02F-425D-A10D-F40683F63E6B}"/>
               </a:ext>
             </a:extLst>
           </p:cNvPr>
@@ -8323,45 +8786,16 @@
           <a:p>
             <a:pPr algn="ctr"/>
             <a:r>
-              <a:rPr lang="fr-FR"/>
+              <a:rPr lang="fr-FR" dirty="0"/>
               <a:t>Tags</a:t>
             </a:r>
-          </a:p>
-        </p:txBody>
-      </p:sp>
-      <p:sp>
-        <p:nvSpPr>
-          <p:cNvPr id="6" name="Espace réservé du numéro de diapositive 5">
-            <a:extLst>
-              <a:ext uri="{FF2B5EF4-FFF2-40B4-BE49-F238E27FC236}">
-                <a16:creationId xmlns:a16="http://schemas.microsoft.com/office/drawing/2014/main" id="{35552458-8DA5-4FB9-9B43-06B412C9256A}"/>
-              </a:ext>
-            </a:extLst>
-          </p:cNvPr>
-          <p:cNvSpPr>
-            <a:spLocks noGrp="1"/>
-          </p:cNvSpPr>
-          <p:nvPr>
-            <p:ph type="sldNum" sz="quarter" idx="12"/>
-          </p:nvPr>
-        </p:nvSpPr>
-        <p:spPr/>
-        <p:txBody>
-          <a:bodyPr/>
-          <a:lstStyle/>
-          <a:p>
-            <a:fld id="{3A98EE3D-8CD1-4C3F-BD1C-C98C9596463C}" type="slidenum">
-              <a:rPr lang="en-US" smtClean="0"/>
-              <a:t>4</a:t>
-            </a:fld>
-            <a:endParaRPr lang="en-US" dirty="0"/>
           </a:p>
         </p:txBody>
       </p:sp>
     </p:spTree>
     <p:extLst>
       <p:ext uri="{BB962C8B-B14F-4D97-AF65-F5344CB8AC3E}">
-        <p14:creationId xmlns:p14="http://schemas.microsoft.com/office/powerpoint/2010/main" val="1859674473"/>
+        <p14:creationId xmlns:p14="http://schemas.microsoft.com/office/powerpoint/2010/main" val="3012565636"/>
       </p:ext>
     </p:extLst>
   </p:cSld>
@@ -8665,10 +9099,10 @@
       </p:sp>
       <p:sp>
         <p:nvSpPr>
-          <p:cNvPr id="5" name="ZoneTexte 4">
-            <a:extLst>
-              <a:ext uri="{FF2B5EF4-FFF2-40B4-BE49-F238E27FC236}">
-                <a16:creationId xmlns:a16="http://schemas.microsoft.com/office/drawing/2014/main" id="{B244E908-816C-41EC-8CEA-4CFA488D4C01}"/>
+          <p:cNvPr id="6" name="ZoneTexte 5">
+            <a:extLst>
+              <a:ext uri="{FF2B5EF4-FFF2-40B4-BE49-F238E27FC236}">
+                <a16:creationId xmlns:a16="http://schemas.microsoft.com/office/drawing/2014/main" id="{D90DD628-D1BB-456D-9385-3CD01326F0B7}"/>
               </a:ext>
             </a:extLst>
           </p:cNvPr>
@@ -8708,7 +9142,7 @@
     </p:spTree>
     <p:extLst>
       <p:ext uri="{BB962C8B-B14F-4D97-AF65-F5344CB8AC3E}">
-        <p14:creationId xmlns:p14="http://schemas.microsoft.com/office/powerpoint/2010/main" val="4177625436"/>
+        <p14:creationId xmlns:p14="http://schemas.microsoft.com/office/powerpoint/2010/main" val="1012117474"/>
       </p:ext>
     </p:extLst>
   </p:cSld>
@@ -9284,6 +9718,321 @@
           <p:cNvPr id="2" name="Titre 1">
             <a:extLst>
               <a:ext uri="{FF2B5EF4-FFF2-40B4-BE49-F238E27FC236}">
+                <a16:creationId xmlns:a16="http://schemas.microsoft.com/office/drawing/2014/main" id="{286B0A86-CAC2-41D1-A402-8B006CA8BE21}"/>
+              </a:ext>
+            </a:extLst>
+          </p:cNvPr>
+          <p:cNvSpPr>
+            <a:spLocks noGrp="1"/>
+          </p:cNvSpPr>
+          <p:nvPr>
+            <p:ph type="title"/>
+          </p:nvPr>
+        </p:nvSpPr>
+        <p:spPr>
+          <a:xfrm>
+            <a:off x="643466" y="786383"/>
+            <a:ext cx="3943390" cy="2093975"/>
+          </a:xfrm>
+        </p:spPr>
+        <p:txBody>
+          <a:bodyPr>
+            <a:normAutofit/>
+          </a:bodyPr>
+          <a:lstStyle/>
+          <a:p>
+            <a:r>
+              <a:rPr lang="fr-FR" dirty="0"/>
+              <a:t>Data </a:t>
+            </a:r>
+            <a:r>
+              <a:rPr lang="fr-FR" dirty="0">
+                <a:ea typeface="+mj-lt"/>
+                <a:cs typeface="+mj-lt"/>
+              </a:rPr>
+              <a:t>engineering</a:t>
+            </a:r>
+            <a:r>
+              <a:rPr lang="fr-FR" dirty="0"/>
+              <a:t> - </a:t>
+            </a:r>
+            <a:r>
+              <a:rPr lang="fr-FR" dirty="0" err="1"/>
+              <a:t>Bags</a:t>
+            </a:r>
+            <a:r>
+              <a:rPr lang="fr-FR" dirty="0"/>
+              <a:t> of </a:t>
+            </a:r>
+            <a:r>
+              <a:rPr lang="fr-FR" dirty="0" err="1"/>
+              <a:t>words</a:t>
+            </a:r>
+            <a:r>
+              <a:rPr lang="fr-FR" dirty="0"/>
+              <a:t> </a:t>
+            </a:r>
+          </a:p>
+        </p:txBody>
+      </p:sp>
+      <p:pic>
+        <p:nvPicPr>
+          <p:cNvPr id="5" name="Image 5" descr="Une image contenant capture d’écran&#10;&#10;Description générée avec un niveau de confiance très élevé">
+            <a:extLst>
+              <a:ext uri="{FF2B5EF4-FFF2-40B4-BE49-F238E27FC236}">
+                <a16:creationId xmlns:a16="http://schemas.microsoft.com/office/drawing/2014/main" id="{B92ECFFA-6136-421E-9E55-9496AB67880B}"/>
+              </a:ext>
+            </a:extLst>
+          </p:cNvPr>
+          <p:cNvPicPr>
+            <a:picLocks noGrp="1" noChangeAspect="1"/>
+          </p:cNvPicPr>
+          <p:nvPr>
+            <p:ph idx="1"/>
+          </p:nvPr>
+        </p:nvPicPr>
+        <p:blipFill>
+          <a:blip r:embed="rId3"/>
+          <a:stretch>
+            <a:fillRect/>
+          </a:stretch>
+        </p:blipFill>
+        <p:spPr>
+          <a:xfrm>
+            <a:off x="6534978" y="3191202"/>
+            <a:ext cx="4150492" cy="3666798"/>
+          </a:xfrm>
+          <a:prstGeom prst="rect">
+            <a:avLst/>
+          </a:prstGeom>
+          <a:solidFill>
+            <a:srgbClr val="FFFFFF">
+              <a:shade val="85000"/>
+            </a:srgbClr>
+          </a:solidFill>
+          <a:ln w="88900" cap="sq">
+            <a:solidFill>
+              <a:srgbClr val="FFFFFF"/>
+            </a:solidFill>
+            <a:miter lim="800000"/>
+          </a:ln>
+          <a:effectLst>
+            <a:outerShdw blurRad="55000" dist="18000" dir="5400000" algn="tl" rotWithShape="0">
+              <a:srgbClr val="000000">
+                <a:alpha val="40000"/>
+              </a:srgbClr>
+            </a:outerShdw>
+          </a:effectLst>
+          <a:scene3d>
+            <a:camera prst="orthographicFront"/>
+            <a:lightRig rig="twoPt" dir="t">
+              <a:rot lat="0" lon="0" rev="7200000"/>
+            </a:lightRig>
+          </a:scene3d>
+          <a:sp3d>
+            <a:bevelT w="25400" h="19050"/>
+            <a:contourClr>
+              <a:srgbClr val="FFFFFF"/>
+            </a:contourClr>
+          </a:sp3d>
+        </p:spPr>
+      </p:pic>
+      <p:sp>
+        <p:nvSpPr>
+          <p:cNvPr id="4" name="Espace réservé du texte 3">
+            <a:extLst>
+              <a:ext uri="{FF2B5EF4-FFF2-40B4-BE49-F238E27FC236}">
+                <a16:creationId xmlns:a16="http://schemas.microsoft.com/office/drawing/2014/main" id="{8DBCED7E-1E93-424E-9C19-77ECA43E47F1}"/>
+              </a:ext>
+            </a:extLst>
+          </p:cNvPr>
+          <p:cNvSpPr>
+            <a:spLocks noGrp="1"/>
+          </p:cNvSpPr>
+          <p:nvPr>
+            <p:ph type="body" sz="half" idx="2"/>
+          </p:nvPr>
+        </p:nvSpPr>
+        <p:spPr/>
+        <p:txBody>
+          <a:bodyPr vert="horz" lIns="91440" tIns="45720" rIns="91440" bIns="45720" rtlCol="0" anchor="t">
+            <a:normAutofit/>
+          </a:bodyPr>
+          <a:lstStyle/>
+          <a:p>
+            <a:pPr marL="285750" indent="-285750">
+              <a:buFont typeface="Arial" panose="020F0502020204030204" pitchFamily="34" charset="0"/>
+              <a:buChar char="•"/>
+            </a:pPr>
+            <a:r>
+              <a:rPr lang="fr-FR" dirty="0"/>
+              <a:t>Bag of </a:t>
+            </a:r>
+            <a:r>
+              <a:rPr lang="fr-FR" dirty="0" err="1"/>
+              <a:t>Words</a:t>
+            </a:r>
+            <a:endParaRPr lang="fr-FR" dirty="0"/>
+          </a:p>
+          <a:p>
+            <a:pPr lvl="1">
+              <a:buFont typeface="Arial" panose="020F0502020204030204" pitchFamily="34" charset="0"/>
+              <a:buChar char="•"/>
+            </a:pPr>
+            <a:endParaRPr lang="fr-FR" dirty="0">
+              <a:solidFill>
+                <a:srgbClr val="FFFFFF"/>
+              </a:solidFill>
+            </a:endParaRPr>
+          </a:p>
+          <a:p>
+            <a:pPr lvl="1">
+              <a:buFont typeface="Arial" panose="020F0502020204030204" pitchFamily="34" charset="0"/>
+              <a:buChar char="•"/>
+            </a:pPr>
+            <a:endParaRPr lang="fr-FR" dirty="0"/>
+          </a:p>
+          <a:p>
+            <a:pPr marL="285750" indent="-285750">
+              <a:buFont typeface="Arial" panose="020F0502020204030204" pitchFamily="34" charset="0"/>
+              <a:buChar char="•"/>
+            </a:pPr>
+            <a:r>
+              <a:rPr lang="fr-FR" dirty="0"/>
+              <a:t>TF-IDF</a:t>
+            </a:r>
+            <a:endParaRPr lang="fr-FR" dirty="0">
+              <a:solidFill>
+                <a:srgbClr val="FFFFFF"/>
+              </a:solidFill>
+            </a:endParaRPr>
+          </a:p>
+        </p:txBody>
+      </p:sp>
+      <p:pic>
+        <p:nvPicPr>
+          <p:cNvPr id="3" name="Image 5" descr="Une image contenant texte&#10;&#10;Description générée avec un niveau de confiance très élevé">
+            <a:extLst>
+              <a:ext uri="{FF2B5EF4-FFF2-40B4-BE49-F238E27FC236}">
+                <a16:creationId xmlns:a16="http://schemas.microsoft.com/office/drawing/2014/main" id="{BFDB0291-2D20-40C6-8E24-8730CD6B486B}"/>
+              </a:ext>
+            </a:extLst>
+          </p:cNvPr>
+          <p:cNvPicPr>
+            <a:picLocks noChangeAspect="1"/>
+          </p:cNvPicPr>
+          <p:nvPr/>
+        </p:nvPicPr>
+        <p:blipFill rotWithShape="1">
+          <a:blip r:embed="rId4"/>
+          <a:srcRect l="2371" t="4167" r="1947" b="6424"/>
+          <a:stretch/>
+        </p:blipFill>
+        <p:spPr>
+          <a:xfrm>
+            <a:off x="5213988" y="161689"/>
+            <a:ext cx="6334546" cy="2881361"/>
+          </a:xfrm>
+          <a:prstGeom prst="rect">
+            <a:avLst/>
+          </a:prstGeom>
+          <a:solidFill>
+            <a:srgbClr val="FFFFFF">
+              <a:shade val="85000"/>
+            </a:srgbClr>
+          </a:solidFill>
+          <a:ln w="88900" cap="sq">
+            <a:solidFill>
+              <a:srgbClr val="FFFFFF"/>
+            </a:solidFill>
+            <a:miter lim="800000"/>
+          </a:ln>
+          <a:effectLst>
+            <a:outerShdw blurRad="55000" dist="18000" dir="5400000" algn="tl" rotWithShape="0">
+              <a:srgbClr val="000000">
+                <a:alpha val="40000"/>
+              </a:srgbClr>
+            </a:outerShdw>
+          </a:effectLst>
+          <a:scene3d>
+            <a:camera prst="orthographicFront"/>
+            <a:lightRig rig="twoPt" dir="t">
+              <a:rot lat="0" lon="0" rev="7200000"/>
+            </a:lightRig>
+          </a:scene3d>
+          <a:sp3d>
+            <a:bevelT w="25400" h="19050"/>
+            <a:contourClr>
+              <a:srgbClr val="FFFFFF"/>
+            </a:contourClr>
+          </a:sp3d>
+        </p:spPr>
+      </p:pic>
+      <p:sp>
+        <p:nvSpPr>
+          <p:cNvPr id="6" name="Espace réservé du numéro de diapositive 5">
+            <a:extLst>
+              <a:ext uri="{FF2B5EF4-FFF2-40B4-BE49-F238E27FC236}">
+                <a16:creationId xmlns:a16="http://schemas.microsoft.com/office/drawing/2014/main" id="{D4DBEA10-1570-48D6-92C3-6D47CD2EE58E}"/>
+              </a:ext>
+            </a:extLst>
+          </p:cNvPr>
+          <p:cNvSpPr>
+            <a:spLocks noGrp="1"/>
+          </p:cNvSpPr>
+          <p:nvPr>
+            <p:ph type="sldNum" sz="quarter" idx="12"/>
+          </p:nvPr>
+        </p:nvSpPr>
+        <p:spPr/>
+        <p:txBody>
+          <a:bodyPr/>
+          <a:lstStyle/>
+          <a:p>
+            <a:fld id="{3A98EE3D-8CD1-4C3F-BD1C-C98C9596463C}" type="slidenum">
+              <a:rPr lang="en-US" smtClean="0"/>
+              <a:pPr/>
+              <a:t>8</a:t>
+            </a:fld>
+            <a:endParaRPr lang="en-US" dirty="0"/>
+          </a:p>
+        </p:txBody>
+      </p:sp>
+    </p:spTree>
+    <p:extLst>
+      <p:ext uri="{BB962C8B-B14F-4D97-AF65-F5344CB8AC3E}">
+        <p14:creationId xmlns:p14="http://schemas.microsoft.com/office/powerpoint/2010/main" val="3413631976"/>
+      </p:ext>
+    </p:extLst>
+  </p:cSld>
+  <p:clrMapOvr>
+    <a:masterClrMapping/>
+  </p:clrMapOvr>
+</p:sld>
+</file>
+
+<file path=ppt/slides/slide9.xml><?xml version="1.0" encoding="utf-8"?>
+<p:sld xmlns:a="http://schemas.openxmlformats.org/drawingml/2006/main" xmlns:r="http://schemas.openxmlformats.org/officeDocument/2006/relationships" xmlns:p="http://schemas.openxmlformats.org/presentationml/2006/main">
+  <p:cSld>
+    <p:spTree>
+      <p:nvGrpSpPr>
+        <p:cNvPr id="1" name=""/>
+        <p:cNvGrpSpPr/>
+        <p:nvPr/>
+      </p:nvGrpSpPr>
+      <p:grpSpPr>
+        <a:xfrm>
+          <a:off x="0" y="0"/>
+          <a:ext cx="0" cy="0"/>
+          <a:chOff x="0" y="0"/>
+          <a:chExt cx="0" cy="0"/>
+        </a:xfrm>
+      </p:grpSpPr>
+      <p:sp>
+        <p:nvSpPr>
+          <p:cNvPr id="2" name="Titre 1">
+            <a:extLst>
+              <a:ext uri="{FF2B5EF4-FFF2-40B4-BE49-F238E27FC236}">
                 <a16:creationId xmlns:a16="http://schemas.microsoft.com/office/drawing/2014/main" id="{30A5952A-8292-41C2-A976-82F43639367E}"/>
               </a:ext>
             </a:extLst>
@@ -9307,13 +10056,8 @@
           <a:p>
             <a:r>
               <a:rPr lang="fr-FR" dirty="0"/>
-              <a:t>Data - </a:t>
-            </a:r>
-            <a:r>
-              <a:rPr lang="fr-FR" dirty="0" err="1"/>
-              <a:t>Representation</a:t>
-            </a:r>
-            <a:endParaRPr lang="fr-FR" dirty="0"/>
+              <a:t>Data - Représentation</a:t>
+            </a:r>
           </a:p>
         </p:txBody>
       </p:sp>
@@ -9605,7 +10349,7 @@
             <a:fld id="{3A98EE3D-8CD1-4C3F-BD1C-C98C9596463C}" type="slidenum">
               <a:rPr lang="en-US" smtClean="0"/>
               <a:pPr/>
-              <a:t>8</a:t>
+              <a:t>9</a:t>
             </a:fld>
             <a:endParaRPr lang="en-US" dirty="0"/>
           </a:p>
@@ -9615,321 +10359,6 @@
     <p:extLst>
       <p:ext uri="{BB962C8B-B14F-4D97-AF65-F5344CB8AC3E}">
         <p14:creationId xmlns:p14="http://schemas.microsoft.com/office/powerpoint/2010/main" val="4104078220"/>
-      </p:ext>
-    </p:extLst>
-  </p:cSld>
-  <p:clrMapOvr>
-    <a:masterClrMapping/>
-  </p:clrMapOvr>
-</p:sld>
-</file>
-
-<file path=ppt/slides/slide9.xml><?xml version="1.0" encoding="utf-8"?>
-<p:sld xmlns:a="http://schemas.openxmlformats.org/drawingml/2006/main" xmlns:r="http://schemas.openxmlformats.org/officeDocument/2006/relationships" xmlns:p="http://schemas.openxmlformats.org/presentationml/2006/main">
-  <p:cSld>
-    <p:spTree>
-      <p:nvGrpSpPr>
-        <p:cNvPr id="1" name=""/>
-        <p:cNvGrpSpPr/>
-        <p:nvPr/>
-      </p:nvGrpSpPr>
-      <p:grpSpPr>
-        <a:xfrm>
-          <a:off x="0" y="0"/>
-          <a:ext cx="0" cy="0"/>
-          <a:chOff x="0" y="0"/>
-          <a:chExt cx="0" cy="0"/>
-        </a:xfrm>
-      </p:grpSpPr>
-      <p:sp>
-        <p:nvSpPr>
-          <p:cNvPr id="2" name="Titre 1">
-            <a:extLst>
-              <a:ext uri="{FF2B5EF4-FFF2-40B4-BE49-F238E27FC236}">
-                <a16:creationId xmlns:a16="http://schemas.microsoft.com/office/drawing/2014/main" id="{286B0A86-CAC2-41D1-A402-8B006CA8BE21}"/>
-              </a:ext>
-            </a:extLst>
-          </p:cNvPr>
-          <p:cNvSpPr>
-            <a:spLocks noGrp="1"/>
-          </p:cNvSpPr>
-          <p:nvPr>
-            <p:ph type="title"/>
-          </p:nvPr>
-        </p:nvSpPr>
-        <p:spPr>
-          <a:xfrm>
-            <a:off x="643466" y="786383"/>
-            <a:ext cx="3943390" cy="2093975"/>
-          </a:xfrm>
-        </p:spPr>
-        <p:txBody>
-          <a:bodyPr>
-            <a:normAutofit/>
-          </a:bodyPr>
-          <a:lstStyle/>
-          <a:p>
-            <a:r>
-              <a:rPr lang="fr-FR" dirty="0"/>
-              <a:t>Data </a:t>
-            </a:r>
-            <a:r>
-              <a:rPr lang="fr-FR" dirty="0">
-                <a:ea typeface="+mj-lt"/>
-                <a:cs typeface="+mj-lt"/>
-              </a:rPr>
-              <a:t>engineering</a:t>
-            </a:r>
-            <a:r>
-              <a:rPr lang="fr-FR" dirty="0"/>
-              <a:t> - </a:t>
-            </a:r>
-            <a:r>
-              <a:rPr lang="fr-FR" dirty="0" err="1"/>
-              <a:t>Bags</a:t>
-            </a:r>
-            <a:r>
-              <a:rPr lang="fr-FR" dirty="0"/>
-              <a:t> of </a:t>
-            </a:r>
-            <a:r>
-              <a:rPr lang="fr-FR" dirty="0" err="1"/>
-              <a:t>words</a:t>
-            </a:r>
-            <a:r>
-              <a:rPr lang="fr-FR" dirty="0"/>
-              <a:t> </a:t>
-            </a:r>
-          </a:p>
-        </p:txBody>
-      </p:sp>
-      <p:pic>
-        <p:nvPicPr>
-          <p:cNvPr id="5" name="Image 5" descr="Une image contenant capture d’écran&#10;&#10;Description générée avec un niveau de confiance très élevé">
-            <a:extLst>
-              <a:ext uri="{FF2B5EF4-FFF2-40B4-BE49-F238E27FC236}">
-                <a16:creationId xmlns:a16="http://schemas.microsoft.com/office/drawing/2014/main" id="{B92ECFFA-6136-421E-9E55-9496AB67880B}"/>
-              </a:ext>
-            </a:extLst>
-          </p:cNvPr>
-          <p:cNvPicPr>
-            <a:picLocks noGrp="1" noChangeAspect="1"/>
-          </p:cNvPicPr>
-          <p:nvPr>
-            <p:ph idx="1"/>
-          </p:nvPr>
-        </p:nvPicPr>
-        <p:blipFill>
-          <a:blip r:embed="rId3"/>
-          <a:stretch>
-            <a:fillRect/>
-          </a:stretch>
-        </p:blipFill>
-        <p:spPr>
-          <a:xfrm>
-            <a:off x="6534978" y="3191202"/>
-            <a:ext cx="4150492" cy="3666798"/>
-          </a:xfrm>
-          <a:prstGeom prst="rect">
-            <a:avLst/>
-          </a:prstGeom>
-          <a:solidFill>
-            <a:srgbClr val="FFFFFF">
-              <a:shade val="85000"/>
-            </a:srgbClr>
-          </a:solidFill>
-          <a:ln w="88900" cap="sq">
-            <a:solidFill>
-              <a:srgbClr val="FFFFFF"/>
-            </a:solidFill>
-            <a:miter lim="800000"/>
-          </a:ln>
-          <a:effectLst>
-            <a:outerShdw blurRad="55000" dist="18000" dir="5400000" algn="tl" rotWithShape="0">
-              <a:srgbClr val="000000">
-                <a:alpha val="40000"/>
-              </a:srgbClr>
-            </a:outerShdw>
-          </a:effectLst>
-          <a:scene3d>
-            <a:camera prst="orthographicFront"/>
-            <a:lightRig rig="twoPt" dir="t">
-              <a:rot lat="0" lon="0" rev="7200000"/>
-            </a:lightRig>
-          </a:scene3d>
-          <a:sp3d>
-            <a:bevelT w="25400" h="19050"/>
-            <a:contourClr>
-              <a:srgbClr val="FFFFFF"/>
-            </a:contourClr>
-          </a:sp3d>
-        </p:spPr>
-      </p:pic>
-      <p:sp>
-        <p:nvSpPr>
-          <p:cNvPr id="4" name="Espace réservé du texte 3">
-            <a:extLst>
-              <a:ext uri="{FF2B5EF4-FFF2-40B4-BE49-F238E27FC236}">
-                <a16:creationId xmlns:a16="http://schemas.microsoft.com/office/drawing/2014/main" id="{8DBCED7E-1E93-424E-9C19-77ECA43E47F1}"/>
-              </a:ext>
-            </a:extLst>
-          </p:cNvPr>
-          <p:cNvSpPr>
-            <a:spLocks noGrp="1"/>
-          </p:cNvSpPr>
-          <p:nvPr>
-            <p:ph type="body" sz="half" idx="2"/>
-          </p:nvPr>
-        </p:nvSpPr>
-        <p:spPr/>
-        <p:txBody>
-          <a:bodyPr vert="horz" lIns="91440" tIns="45720" rIns="91440" bIns="45720" rtlCol="0" anchor="t">
-            <a:normAutofit/>
-          </a:bodyPr>
-          <a:lstStyle/>
-          <a:p>
-            <a:pPr marL="285750" indent="-285750">
-              <a:buFont typeface="Arial" panose="020F0502020204030204" pitchFamily="34" charset="0"/>
-              <a:buChar char="•"/>
-            </a:pPr>
-            <a:r>
-              <a:rPr lang="fr-FR" dirty="0"/>
-              <a:t>Bag of </a:t>
-            </a:r>
-            <a:r>
-              <a:rPr lang="fr-FR" dirty="0" err="1"/>
-              <a:t>Words</a:t>
-            </a:r>
-            <a:endParaRPr lang="fr-FR" dirty="0"/>
-          </a:p>
-          <a:p>
-            <a:pPr lvl="1">
-              <a:buFont typeface="Arial" panose="020F0502020204030204" pitchFamily="34" charset="0"/>
-              <a:buChar char="•"/>
-            </a:pPr>
-            <a:endParaRPr lang="fr-FR" dirty="0">
-              <a:solidFill>
-                <a:srgbClr val="FFFFFF"/>
-              </a:solidFill>
-            </a:endParaRPr>
-          </a:p>
-          <a:p>
-            <a:pPr lvl="1">
-              <a:buFont typeface="Arial" panose="020F0502020204030204" pitchFamily="34" charset="0"/>
-              <a:buChar char="•"/>
-            </a:pPr>
-            <a:endParaRPr lang="fr-FR" dirty="0"/>
-          </a:p>
-          <a:p>
-            <a:pPr marL="285750" indent="-285750">
-              <a:buFont typeface="Arial" panose="020F0502020204030204" pitchFamily="34" charset="0"/>
-              <a:buChar char="•"/>
-            </a:pPr>
-            <a:r>
-              <a:rPr lang="fr-FR" dirty="0"/>
-              <a:t>TF-IDF</a:t>
-            </a:r>
-            <a:endParaRPr lang="fr-FR" dirty="0">
-              <a:solidFill>
-                <a:srgbClr val="FFFFFF"/>
-              </a:solidFill>
-            </a:endParaRPr>
-          </a:p>
-        </p:txBody>
-      </p:sp>
-      <p:pic>
-        <p:nvPicPr>
-          <p:cNvPr id="3" name="Image 5" descr="Une image contenant texte&#10;&#10;Description générée avec un niveau de confiance très élevé">
-            <a:extLst>
-              <a:ext uri="{FF2B5EF4-FFF2-40B4-BE49-F238E27FC236}">
-                <a16:creationId xmlns:a16="http://schemas.microsoft.com/office/drawing/2014/main" id="{BFDB0291-2D20-40C6-8E24-8730CD6B486B}"/>
-              </a:ext>
-            </a:extLst>
-          </p:cNvPr>
-          <p:cNvPicPr>
-            <a:picLocks noChangeAspect="1"/>
-          </p:cNvPicPr>
-          <p:nvPr/>
-        </p:nvPicPr>
-        <p:blipFill rotWithShape="1">
-          <a:blip r:embed="rId4"/>
-          <a:srcRect l="2371" t="4167" r="1947" b="6424"/>
-          <a:stretch/>
-        </p:blipFill>
-        <p:spPr>
-          <a:xfrm>
-            <a:off x="5213988" y="161689"/>
-            <a:ext cx="6334546" cy="2881361"/>
-          </a:xfrm>
-          <a:prstGeom prst="rect">
-            <a:avLst/>
-          </a:prstGeom>
-          <a:solidFill>
-            <a:srgbClr val="FFFFFF">
-              <a:shade val="85000"/>
-            </a:srgbClr>
-          </a:solidFill>
-          <a:ln w="88900" cap="sq">
-            <a:solidFill>
-              <a:srgbClr val="FFFFFF"/>
-            </a:solidFill>
-            <a:miter lim="800000"/>
-          </a:ln>
-          <a:effectLst>
-            <a:outerShdw blurRad="55000" dist="18000" dir="5400000" algn="tl" rotWithShape="0">
-              <a:srgbClr val="000000">
-                <a:alpha val="40000"/>
-              </a:srgbClr>
-            </a:outerShdw>
-          </a:effectLst>
-          <a:scene3d>
-            <a:camera prst="orthographicFront"/>
-            <a:lightRig rig="twoPt" dir="t">
-              <a:rot lat="0" lon="0" rev="7200000"/>
-            </a:lightRig>
-          </a:scene3d>
-          <a:sp3d>
-            <a:bevelT w="25400" h="19050"/>
-            <a:contourClr>
-              <a:srgbClr val="FFFFFF"/>
-            </a:contourClr>
-          </a:sp3d>
-        </p:spPr>
-      </p:pic>
-      <p:sp>
-        <p:nvSpPr>
-          <p:cNvPr id="6" name="Espace réservé du numéro de diapositive 5">
-            <a:extLst>
-              <a:ext uri="{FF2B5EF4-FFF2-40B4-BE49-F238E27FC236}">
-                <a16:creationId xmlns:a16="http://schemas.microsoft.com/office/drawing/2014/main" id="{D4DBEA10-1570-48D6-92C3-6D47CD2EE58E}"/>
-              </a:ext>
-            </a:extLst>
-          </p:cNvPr>
-          <p:cNvSpPr>
-            <a:spLocks noGrp="1"/>
-          </p:cNvSpPr>
-          <p:nvPr>
-            <p:ph type="sldNum" sz="quarter" idx="12"/>
-          </p:nvPr>
-        </p:nvSpPr>
-        <p:spPr/>
-        <p:txBody>
-          <a:bodyPr/>
-          <a:lstStyle/>
-          <a:p>
-            <a:fld id="{3A98EE3D-8CD1-4C3F-BD1C-C98C9596463C}" type="slidenum">
-              <a:rPr lang="en-US" smtClean="0"/>
-              <a:pPr/>
-              <a:t>9</a:t>
-            </a:fld>
-            <a:endParaRPr lang="en-US" dirty="0"/>
-          </a:p>
-        </p:txBody>
-      </p:sp>
-    </p:spTree>
-    <p:extLst>
-      <p:ext uri="{BB962C8B-B14F-4D97-AF65-F5344CB8AC3E}">
-        <p14:creationId xmlns:p14="http://schemas.microsoft.com/office/powerpoint/2010/main" val="3413631976"/>
       </p:ext>
     </p:extLst>
   </p:cSld>

</xml_diff>